<commit_message>
Updated MPI intro slides
</commit_message>
<xml_diff>
--- a/Mpi/mpi.pptx
+++ b/Mpi/mpi.pptx
@@ -31,7 +31,8 @@
     <p:sldId id="279" r:id="rId25"/>
     <p:sldId id="280" r:id="rId26"/>
     <p:sldId id="281" r:id="rId27"/>
-    <p:sldId id="271" r:id="rId28"/>
+    <p:sldId id="284" r:id="rId28"/>
+    <p:sldId id="271" r:id="rId29"/>
   </p:sldIdLst>
   <p:sldSz cx="9144000" cy="6858000" type="screen4x3"/>
   <p:notesSz cx="6858000" cy="9144000"/>
@@ -314,7 +315,7 @@
           <a:p>
             <a:fld id="{05D05C77-BEE1-4DA0-9A20-2DDFB0AE2DEB}" type="datetimeFigureOut">
               <a:rPr lang="nl-BE" smtClean="0"/>
-              <a:t>4/12/2015</a:t>
+              <a:t>5/12/2015</a:t>
             </a:fld>
             <a:endParaRPr lang="nl-BE"/>
           </a:p>
@@ -484,7 +485,7 @@
           <a:p>
             <a:fld id="{05D05C77-BEE1-4DA0-9A20-2DDFB0AE2DEB}" type="datetimeFigureOut">
               <a:rPr lang="nl-BE" smtClean="0"/>
-              <a:t>4/12/2015</a:t>
+              <a:t>5/12/2015</a:t>
             </a:fld>
             <a:endParaRPr lang="nl-BE"/>
           </a:p>
@@ -664,7 +665,7 @@
           <a:p>
             <a:fld id="{05D05C77-BEE1-4DA0-9A20-2DDFB0AE2DEB}" type="datetimeFigureOut">
               <a:rPr lang="nl-BE" smtClean="0"/>
-              <a:t>4/12/2015</a:t>
+              <a:t>5/12/2015</a:t>
             </a:fld>
             <a:endParaRPr lang="nl-BE"/>
           </a:p>
@@ -834,7 +835,7 @@
           <a:p>
             <a:fld id="{05D05C77-BEE1-4DA0-9A20-2DDFB0AE2DEB}" type="datetimeFigureOut">
               <a:rPr lang="nl-BE" smtClean="0"/>
-              <a:t>4/12/2015</a:t>
+              <a:t>5/12/2015</a:t>
             </a:fld>
             <a:endParaRPr lang="nl-BE"/>
           </a:p>
@@ -1080,7 +1081,7 @@
           <a:p>
             <a:fld id="{05D05C77-BEE1-4DA0-9A20-2DDFB0AE2DEB}" type="datetimeFigureOut">
               <a:rPr lang="nl-BE" smtClean="0"/>
-              <a:t>4/12/2015</a:t>
+              <a:t>5/12/2015</a:t>
             </a:fld>
             <a:endParaRPr lang="nl-BE"/>
           </a:p>
@@ -1368,7 +1369,7 @@
           <a:p>
             <a:fld id="{05D05C77-BEE1-4DA0-9A20-2DDFB0AE2DEB}" type="datetimeFigureOut">
               <a:rPr lang="nl-BE" smtClean="0"/>
-              <a:t>4/12/2015</a:t>
+              <a:t>5/12/2015</a:t>
             </a:fld>
             <a:endParaRPr lang="nl-BE"/>
           </a:p>
@@ -1790,7 +1791,7 @@
           <a:p>
             <a:fld id="{05D05C77-BEE1-4DA0-9A20-2DDFB0AE2DEB}" type="datetimeFigureOut">
               <a:rPr lang="nl-BE" smtClean="0"/>
-              <a:t>4/12/2015</a:t>
+              <a:t>5/12/2015</a:t>
             </a:fld>
             <a:endParaRPr lang="nl-BE"/>
           </a:p>
@@ -1908,7 +1909,7 @@
           <a:p>
             <a:fld id="{05D05C77-BEE1-4DA0-9A20-2DDFB0AE2DEB}" type="datetimeFigureOut">
               <a:rPr lang="nl-BE" smtClean="0"/>
-              <a:t>4/12/2015</a:t>
+              <a:t>5/12/2015</a:t>
             </a:fld>
             <a:endParaRPr lang="nl-BE"/>
           </a:p>
@@ -2003,7 +2004,7 @@
           <a:p>
             <a:fld id="{05D05C77-BEE1-4DA0-9A20-2DDFB0AE2DEB}" type="datetimeFigureOut">
               <a:rPr lang="nl-BE" smtClean="0"/>
-              <a:t>4/12/2015</a:t>
+              <a:t>5/12/2015</a:t>
             </a:fld>
             <a:endParaRPr lang="nl-BE"/>
           </a:p>
@@ -2280,7 +2281,7 @@
           <a:p>
             <a:fld id="{05D05C77-BEE1-4DA0-9A20-2DDFB0AE2DEB}" type="datetimeFigureOut">
               <a:rPr lang="nl-BE" smtClean="0"/>
-              <a:t>4/12/2015</a:t>
+              <a:t>5/12/2015</a:t>
             </a:fld>
             <a:endParaRPr lang="nl-BE"/>
           </a:p>
@@ -2533,7 +2534,7 @@
           <a:p>
             <a:fld id="{05D05C77-BEE1-4DA0-9A20-2DDFB0AE2DEB}" type="datetimeFigureOut">
               <a:rPr lang="nl-BE" smtClean="0"/>
-              <a:t>4/12/2015</a:t>
+              <a:t>5/12/2015</a:t>
             </a:fld>
             <a:endParaRPr lang="nl-BE"/>
           </a:p>
@@ -2746,7 +2747,7 @@
           <a:p>
             <a:fld id="{05D05C77-BEE1-4DA0-9A20-2DDFB0AE2DEB}" type="datetimeFigureOut">
               <a:rPr lang="nl-BE" smtClean="0"/>
-              <a:t>4/12/2015</a:t>
+              <a:t>5/12/2015</a:t>
             </a:fld>
             <a:endParaRPr lang="nl-BE"/>
           </a:p>
@@ -3191,6 +3192,13 @@
   <p:clrMapOvr>
     <a:masterClrMapping/>
   </p:clrMapOvr>
+  <p:timing>
+    <p:tnLst>
+      <p:par>
+        <p:cTn id="1" dur="indefinite" restart="never" nodeType="tmRoot"/>
+      </p:par>
+    </p:tnLst>
+  </p:timing>
 </p:sld>
 </file>
 
@@ -3324,9 +3332,340 @@
   <p:timing>
     <p:tnLst>
       <p:par>
-        <p:cTn id="1" dur="indefinite" restart="never" nodeType="tmRoot"/>
+        <p:cTn id="1" dur="indefinite" restart="never" nodeType="tmRoot">
+          <p:childTnLst>
+            <p:seq concurrent="1" nextAc="seek">
+              <p:cTn id="2" dur="indefinite" nodeType="mainSeq">
+                <p:childTnLst>
+                  <p:par>
+                    <p:cTn id="3" fill="hold">
+                      <p:stCondLst>
+                        <p:cond delay="indefinite"/>
+                        <p:cond evt="onBegin" delay="0">
+                          <p:tn val="2"/>
+                        </p:cond>
+                      </p:stCondLst>
+                      <p:childTnLst>
+                        <p:par>
+                          <p:cTn id="4" fill="hold">
+                            <p:stCondLst>
+                              <p:cond delay="0"/>
+                            </p:stCondLst>
+                            <p:childTnLst>
+                              <p:par>
+                                <p:cTn id="5" presetID="1" presetClass="entr" presetSubtype="0" fill="hold" grpId="0" nodeType="withEffect">
+                                  <p:stCondLst>
+                                    <p:cond delay="0"/>
+                                  </p:stCondLst>
+                                  <p:childTnLst>
+                                    <p:set>
+                                      <p:cBhvr>
+                                        <p:cTn id="6" dur="1" fill="hold">
+                                          <p:stCondLst>
+                                            <p:cond delay="0"/>
+                                          </p:stCondLst>
+                                        </p:cTn>
+                                        <p:tgtEl>
+                                          <p:spTgt spid="3">
+                                            <p:txEl>
+                                              <p:pRg st="0" end="0"/>
+                                            </p:txEl>
+                                          </p:spTgt>
+                                        </p:tgtEl>
+                                        <p:attrNameLst>
+                                          <p:attrName>style.visibility</p:attrName>
+                                        </p:attrNameLst>
+                                      </p:cBhvr>
+                                      <p:to>
+                                        <p:strVal val="visible"/>
+                                      </p:to>
+                                    </p:set>
+                                  </p:childTnLst>
+                                </p:cTn>
+                              </p:par>
+                            </p:childTnLst>
+                          </p:cTn>
+                        </p:par>
+                      </p:childTnLst>
+                    </p:cTn>
+                  </p:par>
+                  <p:par>
+                    <p:cTn id="7" fill="hold">
+                      <p:stCondLst>
+                        <p:cond delay="indefinite"/>
+                      </p:stCondLst>
+                      <p:childTnLst>
+                        <p:par>
+                          <p:cTn id="8" fill="hold">
+                            <p:stCondLst>
+                              <p:cond delay="0"/>
+                            </p:stCondLst>
+                            <p:childTnLst>
+                              <p:par>
+                                <p:cTn id="9" presetID="1" presetClass="entr" presetSubtype="0" fill="hold" grpId="0" nodeType="clickEffect">
+                                  <p:stCondLst>
+                                    <p:cond delay="0"/>
+                                  </p:stCondLst>
+                                  <p:childTnLst>
+                                    <p:set>
+                                      <p:cBhvr>
+                                        <p:cTn id="10" dur="1" fill="hold">
+                                          <p:stCondLst>
+                                            <p:cond delay="0"/>
+                                          </p:stCondLst>
+                                        </p:cTn>
+                                        <p:tgtEl>
+                                          <p:spTgt spid="3">
+                                            <p:txEl>
+                                              <p:pRg st="1" end="1"/>
+                                            </p:txEl>
+                                          </p:spTgt>
+                                        </p:tgtEl>
+                                        <p:attrNameLst>
+                                          <p:attrName>style.visibility</p:attrName>
+                                        </p:attrNameLst>
+                                      </p:cBhvr>
+                                      <p:to>
+                                        <p:strVal val="visible"/>
+                                      </p:to>
+                                    </p:set>
+                                  </p:childTnLst>
+                                </p:cTn>
+                              </p:par>
+                              <p:par>
+                                <p:cTn id="11" presetID="1" presetClass="entr" presetSubtype="0" fill="hold" grpId="0" nodeType="withEffect">
+                                  <p:stCondLst>
+                                    <p:cond delay="0"/>
+                                  </p:stCondLst>
+                                  <p:childTnLst>
+                                    <p:set>
+                                      <p:cBhvr>
+                                        <p:cTn id="12" dur="1" fill="hold">
+                                          <p:stCondLst>
+                                            <p:cond delay="0"/>
+                                          </p:stCondLst>
+                                        </p:cTn>
+                                        <p:tgtEl>
+                                          <p:spTgt spid="3">
+                                            <p:txEl>
+                                              <p:pRg st="2" end="2"/>
+                                            </p:txEl>
+                                          </p:spTgt>
+                                        </p:tgtEl>
+                                        <p:attrNameLst>
+                                          <p:attrName>style.visibility</p:attrName>
+                                        </p:attrNameLst>
+                                      </p:cBhvr>
+                                      <p:to>
+                                        <p:strVal val="visible"/>
+                                      </p:to>
+                                    </p:set>
+                                  </p:childTnLst>
+                                </p:cTn>
+                              </p:par>
+                              <p:par>
+                                <p:cTn id="13" presetID="1" presetClass="entr" presetSubtype="0" fill="hold" grpId="0" nodeType="withEffect">
+                                  <p:stCondLst>
+                                    <p:cond delay="0"/>
+                                  </p:stCondLst>
+                                  <p:childTnLst>
+                                    <p:set>
+                                      <p:cBhvr>
+                                        <p:cTn id="14" dur="1" fill="hold">
+                                          <p:stCondLst>
+                                            <p:cond delay="0"/>
+                                          </p:stCondLst>
+                                        </p:cTn>
+                                        <p:tgtEl>
+                                          <p:spTgt spid="3">
+                                            <p:txEl>
+                                              <p:pRg st="3" end="3"/>
+                                            </p:txEl>
+                                          </p:spTgt>
+                                        </p:tgtEl>
+                                        <p:attrNameLst>
+                                          <p:attrName>style.visibility</p:attrName>
+                                        </p:attrNameLst>
+                                      </p:cBhvr>
+                                      <p:to>
+                                        <p:strVal val="visible"/>
+                                      </p:to>
+                                    </p:set>
+                                  </p:childTnLst>
+                                </p:cTn>
+                              </p:par>
+                              <p:par>
+                                <p:cTn id="15" presetID="1" presetClass="entr" presetSubtype="0" fill="hold" grpId="0" nodeType="withEffect">
+                                  <p:stCondLst>
+                                    <p:cond delay="0"/>
+                                  </p:stCondLst>
+                                  <p:childTnLst>
+                                    <p:set>
+                                      <p:cBhvr>
+                                        <p:cTn id="16" dur="1" fill="hold">
+                                          <p:stCondLst>
+                                            <p:cond delay="0"/>
+                                          </p:stCondLst>
+                                        </p:cTn>
+                                        <p:tgtEl>
+                                          <p:spTgt spid="3">
+                                            <p:txEl>
+                                              <p:pRg st="4" end="4"/>
+                                            </p:txEl>
+                                          </p:spTgt>
+                                        </p:tgtEl>
+                                        <p:attrNameLst>
+                                          <p:attrName>style.visibility</p:attrName>
+                                        </p:attrNameLst>
+                                      </p:cBhvr>
+                                      <p:to>
+                                        <p:strVal val="visible"/>
+                                      </p:to>
+                                    </p:set>
+                                  </p:childTnLst>
+                                </p:cTn>
+                              </p:par>
+                            </p:childTnLst>
+                          </p:cTn>
+                        </p:par>
+                      </p:childTnLst>
+                    </p:cTn>
+                  </p:par>
+                  <p:par>
+                    <p:cTn id="17" fill="hold">
+                      <p:stCondLst>
+                        <p:cond delay="indefinite"/>
+                      </p:stCondLst>
+                      <p:childTnLst>
+                        <p:par>
+                          <p:cTn id="18" fill="hold">
+                            <p:stCondLst>
+                              <p:cond delay="0"/>
+                            </p:stCondLst>
+                            <p:childTnLst>
+                              <p:par>
+                                <p:cTn id="19" presetID="1" presetClass="entr" presetSubtype="0" fill="hold" grpId="0" nodeType="clickEffect">
+                                  <p:stCondLst>
+                                    <p:cond delay="0"/>
+                                  </p:stCondLst>
+                                  <p:childTnLst>
+                                    <p:set>
+                                      <p:cBhvr>
+                                        <p:cTn id="20" dur="1" fill="hold">
+                                          <p:stCondLst>
+                                            <p:cond delay="0"/>
+                                          </p:stCondLst>
+                                        </p:cTn>
+                                        <p:tgtEl>
+                                          <p:spTgt spid="3">
+                                            <p:txEl>
+                                              <p:pRg st="5" end="5"/>
+                                            </p:txEl>
+                                          </p:spTgt>
+                                        </p:tgtEl>
+                                        <p:attrNameLst>
+                                          <p:attrName>style.visibility</p:attrName>
+                                        </p:attrNameLst>
+                                      </p:cBhvr>
+                                      <p:to>
+                                        <p:strVal val="visible"/>
+                                      </p:to>
+                                    </p:set>
+                                  </p:childTnLst>
+                                </p:cTn>
+                              </p:par>
+                              <p:par>
+                                <p:cTn id="21" presetID="1" presetClass="entr" presetSubtype="0" fill="hold" grpId="0" nodeType="withEffect">
+                                  <p:stCondLst>
+                                    <p:cond delay="0"/>
+                                  </p:stCondLst>
+                                  <p:childTnLst>
+                                    <p:set>
+                                      <p:cBhvr>
+                                        <p:cTn id="22" dur="1" fill="hold">
+                                          <p:stCondLst>
+                                            <p:cond delay="0"/>
+                                          </p:stCondLst>
+                                        </p:cTn>
+                                        <p:tgtEl>
+                                          <p:spTgt spid="3">
+                                            <p:txEl>
+                                              <p:pRg st="6" end="6"/>
+                                            </p:txEl>
+                                          </p:spTgt>
+                                        </p:tgtEl>
+                                        <p:attrNameLst>
+                                          <p:attrName>style.visibility</p:attrName>
+                                        </p:attrNameLst>
+                                      </p:cBhvr>
+                                      <p:to>
+                                        <p:strVal val="visible"/>
+                                      </p:to>
+                                    </p:set>
+                                  </p:childTnLst>
+                                </p:cTn>
+                              </p:par>
+                              <p:par>
+                                <p:cTn id="23" presetID="1" presetClass="entr" presetSubtype="0" fill="hold" grpId="0" nodeType="withEffect">
+                                  <p:stCondLst>
+                                    <p:cond delay="0"/>
+                                  </p:stCondLst>
+                                  <p:childTnLst>
+                                    <p:set>
+                                      <p:cBhvr>
+                                        <p:cTn id="24" dur="1" fill="hold">
+                                          <p:stCondLst>
+                                            <p:cond delay="0"/>
+                                          </p:stCondLst>
+                                        </p:cTn>
+                                        <p:tgtEl>
+                                          <p:spTgt spid="3">
+                                            <p:txEl>
+                                              <p:pRg st="7" end="7"/>
+                                            </p:txEl>
+                                          </p:spTgt>
+                                        </p:tgtEl>
+                                        <p:attrNameLst>
+                                          <p:attrName>style.visibility</p:attrName>
+                                        </p:attrNameLst>
+                                      </p:cBhvr>
+                                      <p:to>
+                                        <p:strVal val="visible"/>
+                                      </p:to>
+                                    </p:set>
+                                  </p:childTnLst>
+                                </p:cTn>
+                              </p:par>
+                            </p:childTnLst>
+                          </p:cTn>
+                        </p:par>
+                      </p:childTnLst>
+                    </p:cTn>
+                  </p:par>
+                </p:childTnLst>
+              </p:cTn>
+              <p:prevCondLst>
+                <p:cond evt="onPrev" delay="0">
+                  <p:tgtEl>
+                    <p:sldTgt/>
+                  </p:tgtEl>
+                </p:cond>
+              </p:prevCondLst>
+              <p:nextCondLst>
+                <p:cond evt="onNext" delay="0">
+                  <p:tgtEl>
+                    <p:sldTgt/>
+                  </p:tgtEl>
+                </p:cond>
+              </p:nextCondLst>
+            </p:seq>
+          </p:childTnLst>
+        </p:cTn>
       </p:par>
     </p:tnLst>
+    <p:bldLst>
+      <p:bldP spid="3" grpId="0" uiExpand="1" build="p"/>
+    </p:bldLst>
   </p:timing>
 </p:sld>
 </file>
@@ -3536,7 +3875,7 @@
             </a:r>
             <a:r>
               <a:rPr lang="nl-BE" dirty="0" err="1" smtClean="0"/>
-              <a:t>MPI_Send</a:t>
+              <a:t>MPI_Ssend</a:t>
             </a:r>
             <a:r>
               <a:rPr lang="nl-BE" dirty="0" smtClean="0"/>
@@ -3956,7 +4295,7 @@
             </a:r>
             <a:r>
               <a:rPr lang="en-US" dirty="0" err="1" smtClean="0"/>
-              <a:t>MPI_Send</a:t>
+              <a:t>MPI_Ssend</a:t>
             </a:r>
             <a:r>
               <a:rPr lang="en-US" dirty="0" smtClean="0"/>
@@ -4058,7 +4397,7 @@
         <p:spPr>
           <a:xfrm>
             <a:off x="539552" y="5025950"/>
-            <a:ext cx="6968446" cy="400110"/>
+            <a:ext cx="7069436" cy="400110"/>
           </a:xfrm>
           <a:prstGeom prst="rect">
             <a:avLst/>
@@ -4073,7 +4412,7 @@
           <a:p>
             <a:r>
               <a:rPr lang="nl-BE" sz="2000" dirty="0" err="1" smtClean="0"/>
-              <a:t>MPI_Send</a:t>
+              <a:t>MPI_Ssend</a:t>
             </a:r>
             <a:r>
               <a:rPr lang="nl-BE" sz="2000" dirty="0" smtClean="0"/>
@@ -4144,9 +4483,376 @@
   <p:timing>
     <p:tnLst>
       <p:par>
-        <p:cTn id="1" dur="indefinite" restart="never" nodeType="tmRoot"/>
+        <p:cTn id="1" dur="indefinite" restart="never" nodeType="tmRoot">
+          <p:childTnLst>
+            <p:seq concurrent="1" nextAc="seek">
+              <p:cTn id="2" dur="indefinite" nodeType="mainSeq">
+                <p:childTnLst>
+                  <p:par>
+                    <p:cTn id="3" fill="hold">
+                      <p:stCondLst>
+                        <p:cond delay="indefinite"/>
+                        <p:cond evt="onBegin" delay="0">
+                          <p:tn val="2"/>
+                        </p:cond>
+                      </p:stCondLst>
+                      <p:childTnLst>
+                        <p:par>
+                          <p:cTn id="4" fill="hold">
+                            <p:stCondLst>
+                              <p:cond delay="0"/>
+                            </p:stCondLst>
+                            <p:childTnLst>
+                              <p:par>
+                                <p:cTn id="5" presetID="1" presetClass="entr" presetSubtype="0" fill="hold" grpId="0" nodeType="withEffect">
+                                  <p:stCondLst>
+                                    <p:cond delay="0"/>
+                                  </p:stCondLst>
+                                  <p:childTnLst>
+                                    <p:set>
+                                      <p:cBhvr>
+                                        <p:cTn id="6" dur="1" fill="hold">
+                                          <p:stCondLst>
+                                            <p:cond delay="0"/>
+                                          </p:stCondLst>
+                                        </p:cTn>
+                                        <p:tgtEl>
+                                          <p:spTgt spid="3">
+                                            <p:txEl>
+                                              <p:pRg st="0" end="0"/>
+                                            </p:txEl>
+                                          </p:spTgt>
+                                        </p:tgtEl>
+                                        <p:attrNameLst>
+                                          <p:attrName>style.visibility</p:attrName>
+                                        </p:attrNameLst>
+                                      </p:cBhvr>
+                                      <p:to>
+                                        <p:strVal val="visible"/>
+                                      </p:to>
+                                    </p:set>
+                                  </p:childTnLst>
+                                </p:cTn>
+                              </p:par>
+                              <p:par>
+                                <p:cTn id="7" presetID="1" presetClass="entr" presetSubtype="0" fill="hold" grpId="0" nodeType="withEffect">
+                                  <p:stCondLst>
+                                    <p:cond delay="0"/>
+                                  </p:stCondLst>
+                                  <p:childTnLst>
+                                    <p:set>
+                                      <p:cBhvr>
+                                        <p:cTn id="8" dur="1" fill="hold">
+                                          <p:stCondLst>
+                                            <p:cond delay="0"/>
+                                          </p:stCondLst>
+                                        </p:cTn>
+                                        <p:tgtEl>
+                                          <p:spTgt spid="3">
+                                            <p:txEl>
+                                              <p:pRg st="1" end="1"/>
+                                            </p:txEl>
+                                          </p:spTgt>
+                                        </p:tgtEl>
+                                        <p:attrNameLst>
+                                          <p:attrName>style.visibility</p:attrName>
+                                        </p:attrNameLst>
+                                      </p:cBhvr>
+                                      <p:to>
+                                        <p:strVal val="visible"/>
+                                      </p:to>
+                                    </p:set>
+                                  </p:childTnLst>
+                                </p:cTn>
+                              </p:par>
+                              <p:par>
+                                <p:cTn id="9" presetID="1" presetClass="entr" presetSubtype="0" fill="hold" grpId="0" nodeType="withEffect">
+                                  <p:stCondLst>
+                                    <p:cond delay="0"/>
+                                  </p:stCondLst>
+                                  <p:childTnLst>
+                                    <p:set>
+                                      <p:cBhvr>
+                                        <p:cTn id="10" dur="1" fill="hold">
+                                          <p:stCondLst>
+                                            <p:cond delay="0"/>
+                                          </p:stCondLst>
+                                        </p:cTn>
+                                        <p:tgtEl>
+                                          <p:spTgt spid="3">
+                                            <p:txEl>
+                                              <p:pRg st="2" end="2"/>
+                                            </p:txEl>
+                                          </p:spTgt>
+                                        </p:tgtEl>
+                                        <p:attrNameLst>
+                                          <p:attrName>style.visibility</p:attrName>
+                                        </p:attrNameLst>
+                                      </p:cBhvr>
+                                      <p:to>
+                                        <p:strVal val="visible"/>
+                                      </p:to>
+                                    </p:set>
+                                  </p:childTnLst>
+                                </p:cTn>
+                              </p:par>
+                              <p:par>
+                                <p:cTn id="11" presetID="1" presetClass="entr" presetSubtype="0" fill="hold" grpId="0" nodeType="withEffect">
+                                  <p:stCondLst>
+                                    <p:cond delay="0"/>
+                                  </p:stCondLst>
+                                  <p:childTnLst>
+                                    <p:set>
+                                      <p:cBhvr>
+                                        <p:cTn id="12" dur="1" fill="hold">
+                                          <p:stCondLst>
+                                            <p:cond delay="0"/>
+                                          </p:stCondLst>
+                                        </p:cTn>
+                                        <p:tgtEl>
+                                          <p:spTgt spid="3">
+                                            <p:txEl>
+                                              <p:pRg st="3" end="3"/>
+                                            </p:txEl>
+                                          </p:spTgt>
+                                        </p:tgtEl>
+                                        <p:attrNameLst>
+                                          <p:attrName>style.visibility</p:attrName>
+                                        </p:attrNameLst>
+                                      </p:cBhvr>
+                                      <p:to>
+                                        <p:strVal val="visible"/>
+                                      </p:to>
+                                    </p:set>
+                                  </p:childTnLst>
+                                </p:cTn>
+                              </p:par>
+                            </p:childTnLst>
+                          </p:cTn>
+                        </p:par>
+                      </p:childTnLst>
+                    </p:cTn>
+                  </p:par>
+                  <p:par>
+                    <p:cTn id="13" fill="hold">
+                      <p:stCondLst>
+                        <p:cond delay="indefinite"/>
+                      </p:stCondLst>
+                      <p:childTnLst>
+                        <p:par>
+                          <p:cTn id="14" fill="hold">
+                            <p:stCondLst>
+                              <p:cond delay="0"/>
+                            </p:stCondLst>
+                            <p:childTnLst>
+                              <p:par>
+                                <p:cTn id="15" presetID="1" presetClass="entr" presetSubtype="0" fill="hold" grpId="0" nodeType="clickEffect">
+                                  <p:stCondLst>
+                                    <p:cond delay="0"/>
+                                  </p:stCondLst>
+                                  <p:childTnLst>
+                                    <p:set>
+                                      <p:cBhvr>
+                                        <p:cTn id="16" dur="1" fill="hold">
+                                          <p:stCondLst>
+                                            <p:cond delay="0"/>
+                                          </p:stCondLst>
+                                        </p:cTn>
+                                        <p:tgtEl>
+                                          <p:spTgt spid="3">
+                                            <p:txEl>
+                                              <p:pRg st="4" end="4"/>
+                                            </p:txEl>
+                                          </p:spTgt>
+                                        </p:tgtEl>
+                                        <p:attrNameLst>
+                                          <p:attrName>style.visibility</p:attrName>
+                                        </p:attrNameLst>
+                                      </p:cBhvr>
+                                      <p:to>
+                                        <p:strVal val="visible"/>
+                                      </p:to>
+                                    </p:set>
+                                  </p:childTnLst>
+                                </p:cTn>
+                              </p:par>
+                            </p:childTnLst>
+                          </p:cTn>
+                        </p:par>
+                      </p:childTnLst>
+                    </p:cTn>
+                  </p:par>
+                  <p:par>
+                    <p:cTn id="17" fill="hold">
+                      <p:stCondLst>
+                        <p:cond delay="indefinite"/>
+                      </p:stCondLst>
+                      <p:childTnLst>
+                        <p:par>
+                          <p:cTn id="18" fill="hold">
+                            <p:stCondLst>
+                              <p:cond delay="0"/>
+                            </p:stCondLst>
+                            <p:childTnLst>
+                              <p:par>
+                                <p:cTn id="19" presetID="1" presetClass="entr" presetSubtype="0" fill="hold" grpId="0" nodeType="clickEffect">
+                                  <p:stCondLst>
+                                    <p:cond delay="0"/>
+                                  </p:stCondLst>
+                                  <p:childTnLst>
+                                    <p:set>
+                                      <p:cBhvr>
+                                        <p:cTn id="20" dur="1" fill="hold">
+                                          <p:stCondLst>
+                                            <p:cond delay="0"/>
+                                          </p:stCondLst>
+                                        </p:cTn>
+                                        <p:tgtEl>
+                                          <p:spTgt spid="3">
+                                            <p:txEl>
+                                              <p:pRg st="5" end="5"/>
+                                            </p:txEl>
+                                          </p:spTgt>
+                                        </p:tgtEl>
+                                        <p:attrNameLst>
+                                          <p:attrName>style.visibility</p:attrName>
+                                        </p:attrNameLst>
+                                      </p:cBhvr>
+                                      <p:to>
+                                        <p:strVal val="visible"/>
+                                      </p:to>
+                                    </p:set>
+                                  </p:childTnLst>
+                                </p:cTn>
+                              </p:par>
+                            </p:childTnLst>
+                          </p:cTn>
+                        </p:par>
+                      </p:childTnLst>
+                    </p:cTn>
+                  </p:par>
+                  <p:par>
+                    <p:cTn id="21" fill="hold">
+                      <p:stCondLst>
+                        <p:cond delay="indefinite"/>
+                      </p:stCondLst>
+                      <p:childTnLst>
+                        <p:par>
+                          <p:cTn id="22" fill="hold">
+                            <p:stCondLst>
+                              <p:cond delay="0"/>
+                            </p:stCondLst>
+                            <p:childTnLst>
+                              <p:par>
+                                <p:cTn id="23" presetID="1" presetClass="entr" presetSubtype="0" fill="hold" grpId="0" nodeType="clickEffect">
+                                  <p:stCondLst>
+                                    <p:cond delay="0"/>
+                                  </p:stCondLst>
+                                  <p:childTnLst>
+                                    <p:set>
+                                      <p:cBhvr>
+                                        <p:cTn id="24" dur="1" fill="hold">
+                                          <p:stCondLst>
+                                            <p:cond delay="0"/>
+                                          </p:stCondLst>
+                                        </p:cTn>
+                                        <p:tgtEl>
+                                          <p:spTgt spid="3">
+                                            <p:txEl>
+                                              <p:pRg st="6" end="6"/>
+                                            </p:txEl>
+                                          </p:spTgt>
+                                        </p:tgtEl>
+                                        <p:attrNameLst>
+                                          <p:attrName>style.visibility</p:attrName>
+                                        </p:attrNameLst>
+                                      </p:cBhvr>
+                                      <p:to>
+                                        <p:strVal val="visible"/>
+                                      </p:to>
+                                    </p:set>
+                                  </p:childTnLst>
+                                </p:cTn>
+                              </p:par>
+                            </p:childTnLst>
+                          </p:cTn>
+                        </p:par>
+                      </p:childTnLst>
+                    </p:cTn>
+                  </p:par>
+                  <p:par>
+                    <p:cTn id="25" fill="hold">
+                      <p:stCondLst>
+                        <p:cond delay="indefinite"/>
+                      </p:stCondLst>
+                      <p:childTnLst>
+                        <p:par>
+                          <p:cTn id="26" fill="hold">
+                            <p:stCondLst>
+                              <p:cond delay="0"/>
+                            </p:stCondLst>
+                            <p:childTnLst>
+                              <p:par>
+                                <p:cTn id="27" presetID="1" presetClass="entr" presetSubtype="0" fill="hold" grpId="0" nodeType="clickEffect">
+                                  <p:stCondLst>
+                                    <p:cond delay="0"/>
+                                  </p:stCondLst>
+                                  <p:childTnLst>
+                                    <p:set>
+                                      <p:cBhvr>
+                                        <p:cTn id="28" dur="1" fill="hold">
+                                          <p:stCondLst>
+                                            <p:cond delay="0"/>
+                                          </p:stCondLst>
+                                        </p:cTn>
+                                        <p:tgtEl>
+                                          <p:spTgt spid="3">
+                                            <p:txEl>
+                                              <p:pRg st="7" end="7"/>
+                                            </p:txEl>
+                                          </p:spTgt>
+                                        </p:tgtEl>
+                                        <p:attrNameLst>
+                                          <p:attrName>style.visibility</p:attrName>
+                                        </p:attrNameLst>
+                                      </p:cBhvr>
+                                      <p:to>
+                                        <p:strVal val="visible"/>
+                                      </p:to>
+                                    </p:set>
+                                  </p:childTnLst>
+                                </p:cTn>
+                              </p:par>
+                            </p:childTnLst>
+                          </p:cTn>
+                        </p:par>
+                      </p:childTnLst>
+                    </p:cTn>
+                  </p:par>
+                </p:childTnLst>
+              </p:cTn>
+              <p:prevCondLst>
+                <p:cond evt="onPrev" delay="0">
+                  <p:tgtEl>
+                    <p:sldTgt/>
+                  </p:tgtEl>
+                </p:cond>
+              </p:prevCondLst>
+              <p:nextCondLst>
+                <p:cond evt="onNext" delay="0">
+                  <p:tgtEl>
+                    <p:sldTgt/>
+                  </p:tgtEl>
+                </p:cond>
+              </p:nextCondLst>
+            </p:seq>
+          </p:childTnLst>
+        </p:cTn>
       </p:par>
     </p:tnLst>
+    <p:bldLst>
+      <p:bldP spid="3" grpId="0" uiExpand="1" build="p"/>
+    </p:bldLst>
   </p:timing>
 </p:sld>
 </file>
@@ -4189,7 +4895,7 @@
             </a:r>
             <a:r>
               <a:rPr lang="en-US" dirty="0" err="1" smtClean="0"/>
-              <a:t>MPI_Send</a:t>
+              <a:t>MPI_Ssend</a:t>
             </a:r>
             <a:r>
               <a:rPr lang="en-US" dirty="0" smtClean="0"/>
@@ -4233,20 +4939,15 @@
           <a:p>
             <a:r>
               <a:rPr lang="en-US" dirty="0" smtClean="0"/>
-              <a:t>Destination/Source of message</a:t>
+              <a:t>Destination/source of message</a:t>
             </a:r>
           </a:p>
           <a:p>
             <a:pPr lvl="1"/>
             <a:r>
               <a:rPr lang="en-US" dirty="0" smtClean="0"/>
-              <a:t>can be wildcard for </a:t>
-            </a:r>
-            <a:r>
-              <a:rPr lang="en-US" dirty="0" smtClean="0"/>
-              <a:t>source in receiver</a:t>
-            </a:r>
-            <a:endParaRPr lang="en-US" dirty="0" smtClean="0"/>
+              <a:t>can be wildcard for source in receiver</a:t>
+            </a:r>
           </a:p>
           <a:p>
             <a:r>
@@ -4319,6 +5020,48 @@
           </a:p>
         </p:txBody>
       </p:sp>
+      <p:sp>
+        <p:nvSpPr>
+          <p:cNvPr id="5" name="TextBox 4"/>
+          <p:cNvSpPr txBox="1"/>
+          <p:nvPr/>
+        </p:nvSpPr>
+        <p:spPr>
+          <a:xfrm>
+            <a:off x="6804248" y="2093947"/>
+            <a:ext cx="2076274" cy="830997"/>
+          </a:xfrm>
+          <a:prstGeom prst="rect">
+            <a:avLst/>
+          </a:prstGeom>
+          <a:noFill/>
+          <a:ln>
+            <a:solidFill>
+              <a:schemeClr val="tx1"/>
+            </a:solidFill>
+          </a:ln>
+        </p:spPr>
+        <p:txBody>
+          <a:bodyPr wrap="none" rtlCol="0">
+            <a:spAutoFit/>
+          </a:bodyPr>
+          <a:lstStyle/>
+          <a:p>
+            <a:r>
+              <a:rPr lang="en-US" sz="2400" dirty="0" smtClean="0"/>
+              <a:t>Note: potential</a:t>
+            </a:r>
+            <a:br>
+              <a:rPr lang="en-US" sz="2400" dirty="0" smtClean="0"/>
+            </a:br>
+            <a:r>
+              <a:rPr lang="en-US" sz="2400" dirty="0" smtClean="0"/>
+              <a:t>for deadlocks!</a:t>
+            </a:r>
+            <a:endParaRPr lang="nl-BE" sz="2400" dirty="0"/>
+          </a:p>
+        </p:txBody>
+      </p:sp>
     </p:spTree>
     <p:extLst>
       <p:ext uri="{BB962C8B-B14F-4D97-AF65-F5344CB8AC3E}">
@@ -4341,6 +5084,9 @@
                     <p:cTn id="3" fill="hold">
                       <p:stCondLst>
                         <p:cond delay="indefinite"/>
+                        <p:cond evt="onBegin" delay="0">
+                          <p:tn val="2"/>
+                        </p:cond>
                       </p:stCondLst>
                       <p:childTnLst>
                         <p:par>
@@ -4350,7 +5096,7 @@
                             </p:stCondLst>
                             <p:childTnLst>
                               <p:par>
-                                <p:cTn id="5" presetID="1" presetClass="entr" presetSubtype="0" fill="hold" grpId="0" nodeType="clickEffect">
+                                <p:cTn id="5" presetID="1" presetClass="entr" presetSubtype="0" fill="hold" grpId="0" nodeType="withEffect">
                                   <p:stCondLst>
                                     <p:cond delay="0"/>
                                   </p:stCondLst>
@@ -4358,6 +5104,326 @@
                                     <p:set>
                                       <p:cBhvr>
                                         <p:cTn id="6" dur="1" fill="hold">
+                                          <p:stCondLst>
+                                            <p:cond delay="0"/>
+                                          </p:stCondLst>
+                                        </p:cTn>
+                                        <p:tgtEl>
+                                          <p:spTgt spid="3">
+                                            <p:txEl>
+                                              <p:pRg st="0" end="0"/>
+                                            </p:txEl>
+                                          </p:spTgt>
+                                        </p:tgtEl>
+                                        <p:attrNameLst>
+                                          <p:attrName>style.visibility</p:attrName>
+                                        </p:attrNameLst>
+                                      </p:cBhvr>
+                                      <p:to>
+                                        <p:strVal val="visible"/>
+                                      </p:to>
+                                    </p:set>
+                                  </p:childTnLst>
+                                </p:cTn>
+                              </p:par>
+                            </p:childTnLst>
+                          </p:cTn>
+                        </p:par>
+                      </p:childTnLst>
+                    </p:cTn>
+                  </p:par>
+                  <p:par>
+                    <p:cTn id="7" fill="hold">
+                      <p:stCondLst>
+                        <p:cond delay="indefinite"/>
+                      </p:stCondLst>
+                      <p:childTnLst>
+                        <p:par>
+                          <p:cTn id="8" fill="hold">
+                            <p:stCondLst>
+                              <p:cond delay="0"/>
+                            </p:stCondLst>
+                            <p:childTnLst>
+                              <p:par>
+                                <p:cTn id="9" presetID="1" presetClass="entr" presetSubtype="0" fill="hold" grpId="0" nodeType="clickEffect">
+                                  <p:stCondLst>
+                                    <p:cond delay="0"/>
+                                  </p:stCondLst>
+                                  <p:childTnLst>
+                                    <p:set>
+                                      <p:cBhvr>
+                                        <p:cTn id="10" dur="1" fill="hold">
+                                          <p:stCondLst>
+                                            <p:cond delay="0"/>
+                                          </p:stCondLst>
+                                        </p:cTn>
+                                        <p:tgtEl>
+                                          <p:spTgt spid="3">
+                                            <p:txEl>
+                                              <p:pRg st="1" end="1"/>
+                                            </p:txEl>
+                                          </p:spTgt>
+                                        </p:tgtEl>
+                                        <p:attrNameLst>
+                                          <p:attrName>style.visibility</p:attrName>
+                                        </p:attrNameLst>
+                                      </p:cBhvr>
+                                      <p:to>
+                                        <p:strVal val="visible"/>
+                                      </p:to>
+                                    </p:set>
+                                  </p:childTnLst>
+                                </p:cTn>
+                              </p:par>
+                              <p:par>
+                                <p:cTn id="11" presetID="1" presetClass="entr" presetSubtype="0" fill="hold" grpId="0" nodeType="withEffect">
+                                  <p:stCondLst>
+                                    <p:cond delay="0"/>
+                                  </p:stCondLst>
+                                  <p:childTnLst>
+                                    <p:set>
+                                      <p:cBhvr>
+                                        <p:cTn id="12" dur="1" fill="hold">
+                                          <p:stCondLst>
+                                            <p:cond delay="0"/>
+                                          </p:stCondLst>
+                                        </p:cTn>
+                                        <p:tgtEl>
+                                          <p:spTgt spid="3">
+                                            <p:txEl>
+                                              <p:pRg st="2" end="2"/>
+                                            </p:txEl>
+                                          </p:spTgt>
+                                        </p:tgtEl>
+                                        <p:attrNameLst>
+                                          <p:attrName>style.visibility</p:attrName>
+                                        </p:attrNameLst>
+                                      </p:cBhvr>
+                                      <p:to>
+                                        <p:strVal val="visible"/>
+                                      </p:to>
+                                    </p:set>
+                                  </p:childTnLst>
+                                </p:cTn>
+                              </p:par>
+                            </p:childTnLst>
+                          </p:cTn>
+                        </p:par>
+                      </p:childTnLst>
+                    </p:cTn>
+                  </p:par>
+                  <p:par>
+                    <p:cTn id="13" fill="hold">
+                      <p:stCondLst>
+                        <p:cond delay="indefinite"/>
+                      </p:stCondLst>
+                      <p:childTnLst>
+                        <p:par>
+                          <p:cTn id="14" fill="hold">
+                            <p:stCondLst>
+                              <p:cond delay="0"/>
+                            </p:stCondLst>
+                            <p:childTnLst>
+                              <p:par>
+                                <p:cTn id="15" presetID="1" presetClass="entr" presetSubtype="0" fill="hold" grpId="0" nodeType="clickEffect">
+                                  <p:stCondLst>
+                                    <p:cond delay="0"/>
+                                  </p:stCondLst>
+                                  <p:childTnLst>
+                                    <p:set>
+                                      <p:cBhvr>
+                                        <p:cTn id="16" dur="1" fill="hold">
+                                          <p:stCondLst>
+                                            <p:cond delay="0"/>
+                                          </p:stCondLst>
+                                        </p:cTn>
+                                        <p:tgtEl>
+                                          <p:spTgt spid="3">
+                                            <p:txEl>
+                                              <p:pRg st="3" end="3"/>
+                                            </p:txEl>
+                                          </p:spTgt>
+                                        </p:tgtEl>
+                                        <p:attrNameLst>
+                                          <p:attrName>style.visibility</p:attrName>
+                                        </p:attrNameLst>
+                                      </p:cBhvr>
+                                      <p:to>
+                                        <p:strVal val="visible"/>
+                                      </p:to>
+                                    </p:set>
+                                  </p:childTnLst>
+                                </p:cTn>
+                              </p:par>
+                              <p:par>
+                                <p:cTn id="17" presetID="1" presetClass="entr" presetSubtype="0" fill="hold" grpId="0" nodeType="withEffect">
+                                  <p:stCondLst>
+                                    <p:cond delay="0"/>
+                                  </p:stCondLst>
+                                  <p:childTnLst>
+                                    <p:set>
+                                      <p:cBhvr>
+                                        <p:cTn id="18" dur="1" fill="hold">
+                                          <p:stCondLst>
+                                            <p:cond delay="0"/>
+                                          </p:stCondLst>
+                                        </p:cTn>
+                                        <p:tgtEl>
+                                          <p:spTgt spid="3">
+                                            <p:txEl>
+                                              <p:pRg st="4" end="4"/>
+                                            </p:txEl>
+                                          </p:spTgt>
+                                        </p:tgtEl>
+                                        <p:attrNameLst>
+                                          <p:attrName>style.visibility</p:attrName>
+                                        </p:attrNameLst>
+                                      </p:cBhvr>
+                                      <p:to>
+                                        <p:strVal val="visible"/>
+                                      </p:to>
+                                    </p:set>
+                                  </p:childTnLst>
+                                </p:cTn>
+                              </p:par>
+                            </p:childTnLst>
+                          </p:cTn>
+                        </p:par>
+                      </p:childTnLst>
+                    </p:cTn>
+                  </p:par>
+                  <p:par>
+                    <p:cTn id="19" fill="hold">
+                      <p:stCondLst>
+                        <p:cond delay="indefinite"/>
+                      </p:stCondLst>
+                      <p:childTnLst>
+                        <p:par>
+                          <p:cTn id="20" fill="hold">
+                            <p:stCondLst>
+                              <p:cond delay="0"/>
+                            </p:stCondLst>
+                            <p:childTnLst>
+                              <p:par>
+                                <p:cTn id="21" presetID="1" presetClass="entr" presetSubtype="0" fill="hold" grpId="0" nodeType="clickEffect">
+                                  <p:stCondLst>
+                                    <p:cond delay="0"/>
+                                  </p:stCondLst>
+                                  <p:childTnLst>
+                                    <p:set>
+                                      <p:cBhvr>
+                                        <p:cTn id="22" dur="1" fill="hold">
+                                          <p:stCondLst>
+                                            <p:cond delay="0"/>
+                                          </p:stCondLst>
+                                        </p:cTn>
+                                        <p:tgtEl>
+                                          <p:spTgt spid="3">
+                                            <p:txEl>
+                                              <p:pRg st="5" end="5"/>
+                                            </p:txEl>
+                                          </p:spTgt>
+                                        </p:tgtEl>
+                                        <p:attrNameLst>
+                                          <p:attrName>style.visibility</p:attrName>
+                                        </p:attrNameLst>
+                                      </p:cBhvr>
+                                      <p:to>
+                                        <p:strVal val="visible"/>
+                                      </p:to>
+                                    </p:set>
+                                  </p:childTnLst>
+                                </p:cTn>
+                              </p:par>
+                              <p:par>
+                                <p:cTn id="23" presetID="1" presetClass="entr" presetSubtype="0" fill="hold" grpId="0" nodeType="withEffect">
+                                  <p:stCondLst>
+                                    <p:cond delay="0"/>
+                                  </p:stCondLst>
+                                  <p:childTnLst>
+                                    <p:set>
+                                      <p:cBhvr>
+                                        <p:cTn id="24" dur="1" fill="hold">
+                                          <p:stCondLst>
+                                            <p:cond delay="0"/>
+                                          </p:stCondLst>
+                                        </p:cTn>
+                                        <p:tgtEl>
+                                          <p:spTgt spid="3">
+                                            <p:txEl>
+                                              <p:pRg st="6" end="6"/>
+                                            </p:txEl>
+                                          </p:spTgt>
+                                        </p:tgtEl>
+                                        <p:attrNameLst>
+                                          <p:attrName>style.visibility</p:attrName>
+                                        </p:attrNameLst>
+                                      </p:cBhvr>
+                                      <p:to>
+                                        <p:strVal val="visible"/>
+                                      </p:to>
+                                    </p:set>
+                                  </p:childTnLst>
+                                </p:cTn>
+                              </p:par>
+                              <p:par>
+                                <p:cTn id="25" presetID="1" presetClass="entr" presetSubtype="0" fill="hold" grpId="0" nodeType="withEffect">
+                                  <p:stCondLst>
+                                    <p:cond delay="0"/>
+                                  </p:stCondLst>
+                                  <p:childTnLst>
+                                    <p:set>
+                                      <p:cBhvr>
+                                        <p:cTn id="26" dur="1" fill="hold">
+                                          <p:stCondLst>
+                                            <p:cond delay="0"/>
+                                          </p:stCondLst>
+                                        </p:cTn>
+                                        <p:tgtEl>
+                                          <p:spTgt spid="3">
+                                            <p:txEl>
+                                              <p:pRg st="7" end="7"/>
+                                            </p:txEl>
+                                          </p:spTgt>
+                                        </p:tgtEl>
+                                        <p:attrNameLst>
+                                          <p:attrName>style.visibility</p:attrName>
+                                        </p:attrNameLst>
+                                      </p:cBhvr>
+                                      <p:to>
+                                        <p:strVal val="visible"/>
+                                      </p:to>
+                                    </p:set>
+                                  </p:childTnLst>
+                                </p:cTn>
+                              </p:par>
+                            </p:childTnLst>
+                          </p:cTn>
+                        </p:par>
+                      </p:childTnLst>
+                    </p:cTn>
+                  </p:par>
+                  <p:par>
+                    <p:cTn id="27" fill="hold">
+                      <p:stCondLst>
+                        <p:cond delay="indefinite"/>
+                      </p:stCondLst>
+                      <p:childTnLst>
+                        <p:par>
+                          <p:cTn id="28" fill="hold">
+                            <p:stCondLst>
+                              <p:cond delay="0"/>
+                            </p:stCondLst>
+                            <p:childTnLst>
+                              <p:par>
+                                <p:cTn id="29" presetID="1" presetClass="entr" presetSubtype="0" fill="hold" grpId="0" nodeType="clickEffect">
+                                  <p:stCondLst>
+                                    <p:cond delay="0"/>
+                                  </p:stCondLst>
+                                  <p:childTnLst>
+                                    <p:set>
+                                      <p:cBhvr>
+                                        <p:cTn id="30" dur="1" fill="hold">
                                           <p:stCondLst>
                                             <p:cond delay="0"/>
                                           </p:stCondLst>
@@ -4404,6 +5470,7 @@
       </p:par>
     </p:tnLst>
     <p:bldLst>
+      <p:bldP spid="3" grpId="0" uiExpand="1" build="p"/>
       <p:bldP spid="4" grpId="0" animBg="1"/>
     </p:bldLst>
   </p:timing>
@@ -4462,7 +5529,9 @@
         </p:nvSpPr>
         <p:spPr/>
         <p:txBody>
-          <a:bodyPr/>
+          <a:bodyPr>
+            <a:normAutofit lnSpcReduction="10000"/>
+          </a:bodyPr>
           <a:lstStyle/>
           <a:p>
             <a:r>
@@ -4553,6 +5622,13 @@
             <a:r>
               <a:rPr lang="en-US" dirty="0" smtClean="0"/>
               <a:t> in C)</a:t>
+            </a:r>
+          </a:p>
+          <a:p>
+            <a:pPr lvl="1"/>
+            <a:r>
+              <a:rPr lang="en-US" dirty="0" smtClean="0"/>
+              <a:t>…</a:t>
             </a:r>
             <a:endParaRPr lang="nl-BE" dirty="0"/>
           </a:p>
@@ -4580,6 +5656,9 @@
                     <p:cTn id="3" fill="hold">
                       <p:stCondLst>
                         <p:cond delay="indefinite"/>
+                        <p:cond evt="onBegin" delay="0">
+                          <p:tn val="2"/>
+                        </p:cond>
                       </p:stCondLst>
                       <p:childTnLst>
                         <p:par>
@@ -4589,7 +5668,7 @@
                             </p:stCondLst>
                             <p:childTnLst>
                               <p:par>
-                                <p:cTn id="5" presetID="1" presetClass="entr" presetSubtype="0" fill="hold" grpId="0" nodeType="clickEffect">
+                                <p:cTn id="5" presetID="1" presetClass="entr" presetSubtype="0" fill="hold" grpId="0" nodeType="withEffect">
                                   <p:stCondLst>
                                     <p:cond delay="0"/>
                                   </p:stCondLst>
@@ -4854,6 +5933,37 @@
                                   </p:childTnLst>
                                 </p:cTn>
                               </p:par>
+                              <p:par>
+                                <p:cTn id="23" presetID="1" presetClass="entr" presetSubtype="0" fill="hold" grpId="0" nodeType="withEffect">
+                                  <p:stCondLst>
+                                    <p:cond delay="0"/>
+                                  </p:stCondLst>
+                                  <p:childTnLst>
+                                    <p:set>
+                                      <p:cBhvr>
+                                        <p:cTn id="24" dur="1" fill="hold">
+                                          <p:stCondLst>
+                                            <p:cond delay="0"/>
+                                          </p:stCondLst>
+                                        </p:cTn>
+                                        <p:tgtEl>
+                                          <p:spTgt spid="3">
+                                            <p:txEl>
+                                              <p:pRg st="8" end="8"/>
+                                            </p:txEl>
+                                          </p:spTgt>
+                                        </p:tgtEl>
+                                        <p:attrNameLst>
+                                          <p:attrName>style.visibility</p:attrName>
+                                        </p:attrNameLst>
+                                      </p:cBhvr>
+                                      <p:to>
+                                        <p:strVal val="visible"/>
+                                      </p:to>
+                                    </p:set>
+                                  </p:childTnLst>
+                                </p:cTn>
+                              </p:par>
                             </p:childTnLst>
                           </p:cTn>
                         </p:par>
@@ -4882,7 +5992,7 @@
       </p:par>
     </p:tnLst>
     <p:bldLst>
-      <p:bldP spid="3" grpId="0" build="p"/>
+      <p:bldP spid="3" grpId="0" uiExpand="1" build="p"/>
     </p:bldLst>
   </p:timing>
 </p:sld>
@@ -5795,7 +6905,7 @@
         <p:spPr>
           <a:xfrm>
             <a:off x="323528" y="2409850"/>
-            <a:ext cx="7595349" cy="3539430"/>
+            <a:ext cx="7702750" cy="3539430"/>
           </a:xfrm>
           <a:prstGeom prst="rect">
             <a:avLst/>
@@ -5986,32 +7096,18 @@
               <a:t>    </a:t>
             </a:r>
             <a:r>
-              <a:rPr lang="en-US" sz="1400" dirty="0" err="1">
+              <a:rPr lang="en-US" sz="1400" dirty="0" err="1" smtClean="0">
                 <a:latin typeface="Courier New" panose="02070309020205020404" pitchFamily="49" charset="0"/>
                 <a:cs typeface="Courier New" panose="02070309020205020404" pitchFamily="49" charset="0"/>
               </a:rPr>
-              <a:t>MPI_Send</a:t>
+              <a:t>MPI_Ssend</a:t>
             </a:r>
             <a:r>
               <a:rPr lang="en-US" sz="1400" dirty="0">
                 <a:latin typeface="Courier New" panose="02070309020205020404" pitchFamily="49" charset="0"/>
                 <a:cs typeface="Courier New" panose="02070309020205020404" pitchFamily="49" charset="0"/>
               </a:rPr>
-              <a:t>(&amp;(matrix[N + 1]), 1, </a:t>
-            </a:r>
-            <a:r>
-              <a:rPr lang="en-US" sz="1400" dirty="0" err="1">
-                <a:latin typeface="Courier New" panose="02070309020205020404" pitchFamily="49" charset="0"/>
-                <a:cs typeface="Courier New" panose="02070309020205020404" pitchFamily="49" charset="0"/>
-              </a:rPr>
-              <a:t>submatrix</a:t>
-            </a:r>
-            <a:r>
-              <a:rPr lang="en-US" sz="1400" dirty="0">
-                <a:latin typeface="Courier New" panose="02070309020205020404" pitchFamily="49" charset="0"/>
-                <a:cs typeface="Courier New" panose="02070309020205020404" pitchFamily="49" charset="0"/>
-              </a:rPr>
-              <a:t>, 1, TAG, MPI_COMM_WORLD</a:t>
+              <a:t>(&amp;(matrix[N + 1]), 1, submatrix, 1, TAG, MPI_COMM_WORLD</a:t>
             </a:r>
             <a:r>
               <a:rPr lang="en-US" sz="1400" dirty="0" smtClean="0">
@@ -7981,48 +9077,105 @@
           </p:style>
         </p:cxnSp>
       </p:grpSp>
-      <p:sp>
-        <p:nvSpPr>
-          <p:cNvPr id="56" name="TextBox 55"/>
-          <p:cNvSpPr txBox="1"/>
+      <p:grpSp>
+        <p:nvGrpSpPr>
+          <p:cNvPr id="34" name="Group 33"/>
+          <p:cNvGrpSpPr/>
           <p:nvPr/>
-        </p:nvSpPr>
-        <p:spPr>
+        </p:nvGrpSpPr>
+        <p:grpSpPr>
           <a:xfrm>
-            <a:off x="6588224" y="5301208"/>
-            <a:ext cx="1937005" cy="954107"/>
+            <a:off x="5220072" y="4890646"/>
+            <a:ext cx="3754576" cy="1418674"/>
+            <a:chOff x="5281920" y="4725144"/>
+            <a:chExt cx="3754576" cy="1418674"/>
           </a:xfrm>
-          <a:prstGeom prst="rect">
-            <a:avLst/>
-          </a:prstGeom>
-          <a:noFill/>
-          <a:ln>
-            <a:solidFill>
-              <a:schemeClr val="tx1"/>
-            </a:solidFill>
-          </a:ln>
-        </p:spPr>
-        <p:txBody>
-          <a:bodyPr wrap="none" rtlCol="0">
-            <a:spAutoFit/>
-          </a:bodyPr>
-          <a:lstStyle/>
-          <a:p>
-            <a:r>
-              <a:rPr lang="en-US" sz="2800" dirty="0" smtClean="0"/>
-              <a:t>Don't forget</a:t>
-            </a:r>
-            <a:br>
-              <a:rPr lang="en-US" sz="2800" dirty="0" smtClean="0"/>
-            </a:br>
-            <a:r>
-              <a:rPr lang="en-US" sz="2800" dirty="0" smtClean="0"/>
-              <a:t>to commit!</a:t>
-            </a:r>
-            <a:endParaRPr lang="nl-BE" sz="2800" dirty="0"/>
-          </a:p>
-        </p:txBody>
-      </p:sp>
+        </p:grpSpPr>
+        <p:sp>
+          <p:nvSpPr>
+            <p:cNvPr id="56" name="TextBox 55"/>
+            <p:cNvSpPr txBox="1"/>
+            <p:nvPr/>
+          </p:nvSpPr>
+          <p:spPr>
+            <a:xfrm>
+              <a:off x="6307403" y="4725144"/>
+              <a:ext cx="1937005" cy="954107"/>
+            </a:xfrm>
+            <a:prstGeom prst="rect">
+              <a:avLst/>
+            </a:prstGeom>
+            <a:noFill/>
+            <a:ln>
+              <a:solidFill>
+                <a:schemeClr val="tx1"/>
+              </a:solidFill>
+            </a:ln>
+          </p:spPr>
+          <p:txBody>
+            <a:bodyPr wrap="none" rtlCol="0">
+              <a:spAutoFit/>
+            </a:bodyPr>
+            <a:lstStyle/>
+            <a:p>
+              <a:r>
+                <a:rPr lang="en-US" sz="2800" dirty="0" smtClean="0"/>
+                <a:t>Don't forget</a:t>
+              </a:r>
+              <a:br>
+                <a:rPr lang="en-US" sz="2800" dirty="0" smtClean="0"/>
+              </a:br>
+              <a:r>
+                <a:rPr lang="en-US" sz="2800" dirty="0" smtClean="0"/>
+                <a:t>to commit!</a:t>
+              </a:r>
+              <a:endParaRPr lang="nl-BE" sz="2800" dirty="0"/>
+            </a:p>
+          </p:txBody>
+        </p:sp>
+        <p:sp>
+          <p:nvSpPr>
+            <p:cNvPr id="49" name="Rectangle 48"/>
+            <p:cNvSpPr/>
+            <p:nvPr/>
+          </p:nvSpPr>
+          <p:spPr>
+            <a:xfrm>
+              <a:off x="5281920" y="5805264"/>
+              <a:ext cx="3754576" cy="338554"/>
+            </a:xfrm>
+            <a:prstGeom prst="rect">
+              <a:avLst/>
+            </a:prstGeom>
+          </p:spPr>
+          <p:txBody>
+            <a:bodyPr wrap="square">
+              <a:spAutoFit/>
+            </a:bodyPr>
+            <a:lstStyle/>
+            <a:p>
+              <a:r>
+                <a:rPr lang="en-US" sz="1600" dirty="0" err="1" smtClean="0">
+                  <a:latin typeface="Courier New" panose="02070309020205020404" pitchFamily="49" charset="0"/>
+                  <a:cs typeface="Courier New" panose="02070309020205020404" pitchFamily="49" charset="0"/>
+                </a:rPr>
+                <a:t>MPI_Type_commit</a:t>
+              </a:r>
+              <a:r>
+                <a:rPr lang="en-US" sz="1600" dirty="0" smtClean="0">
+                  <a:latin typeface="Courier New" panose="02070309020205020404" pitchFamily="49" charset="0"/>
+                  <a:cs typeface="Courier New" panose="02070309020205020404" pitchFamily="49" charset="0"/>
+                </a:rPr>
+                <a:t>(&amp;submatrix);</a:t>
+              </a:r>
+              <a:endParaRPr lang="nl-BE" sz="1600" dirty="0">
+                <a:latin typeface="Courier New" panose="02070309020205020404" pitchFamily="49" charset="0"/>
+                <a:cs typeface="Courier New" panose="02070309020205020404" pitchFamily="49" charset="0"/>
+              </a:endParaRPr>
+            </a:p>
+          </p:txBody>
+        </p:sp>
+      </p:grpSp>
     </p:spTree>
     <p:extLst>
       <p:ext uri="{BB962C8B-B14F-4D97-AF65-F5344CB8AC3E}">
@@ -8084,6 +9237,33 @@
                                   </p:childTnLst>
                                 </p:cTn>
                               </p:par>
+                              <p:par>
+                                <p:cTn id="7" presetID="1" presetClass="entr" presetSubtype="0" fill="hold" nodeType="withEffect">
+                                  <p:stCondLst>
+                                    <p:cond delay="0"/>
+                                  </p:stCondLst>
+                                  <p:childTnLst>
+                                    <p:set>
+                                      <p:cBhvr>
+                                        <p:cTn id="8" dur="1" fill="hold">
+                                          <p:stCondLst>
+                                            <p:cond delay="0"/>
+                                          </p:stCondLst>
+                                        </p:cTn>
+                                        <p:tgtEl>
+                                          <p:spTgt spid="31"/>
+                                        </p:tgtEl>
+                                        <p:attrNameLst>
+                                          <p:attrName>style.visibility</p:attrName>
+                                        </p:attrNameLst>
+                                      </p:cBhvr>
+                                      <p:to>
+                                        <p:strVal val="visible"/>
+                                      </p:to>
+                                    </p:set>
+                                  </p:childTnLst>
+                                </p:cTn>
+                              </p:par>
                             </p:childTnLst>
                           </p:cTn>
                         </p:par>
@@ -8091,26 +9271,26 @@
                     </p:cTn>
                   </p:par>
                   <p:par>
-                    <p:cTn id="7" fill="hold">
+                    <p:cTn id="9" fill="hold">
                       <p:stCondLst>
                         <p:cond delay="indefinite"/>
                       </p:stCondLst>
                       <p:childTnLst>
                         <p:par>
-                          <p:cTn id="8" fill="hold">
+                          <p:cTn id="10" fill="hold">
                             <p:stCondLst>
                               <p:cond delay="0"/>
                             </p:stCondLst>
                             <p:childTnLst>
                               <p:par>
-                                <p:cTn id="9" presetID="1" presetClass="entr" presetSubtype="0" fill="hold" grpId="0" nodeType="clickEffect">
+                                <p:cTn id="11" presetID="1" presetClass="entr" presetSubtype="0" fill="hold" grpId="0" nodeType="clickEffect">
                                   <p:stCondLst>
                                     <p:cond delay="0"/>
                                   </p:stCondLst>
                                   <p:childTnLst>
                                     <p:set>
                                       <p:cBhvr>
-                                        <p:cTn id="10" dur="1" fill="hold">
+                                        <p:cTn id="12" dur="1" fill="hold">
                                           <p:stCondLst>
                                             <p:cond delay="0"/>
                                           </p:stCondLst>
@@ -8133,26 +9313,8 @@
                                   </p:childTnLst>
                                 </p:cTn>
                               </p:par>
-                            </p:childTnLst>
-                          </p:cTn>
-                        </p:par>
-                      </p:childTnLst>
-                    </p:cTn>
-                  </p:par>
-                  <p:par>
-                    <p:cTn id="11" fill="hold">
-                      <p:stCondLst>
-                        <p:cond delay="indefinite"/>
-                      </p:stCondLst>
-                      <p:childTnLst>
-                        <p:par>
-                          <p:cTn id="12" fill="hold">
-                            <p:stCondLst>
-                              <p:cond delay="0"/>
-                            </p:stCondLst>
-                            <p:childTnLst>
                               <p:par>
-                                <p:cTn id="13" presetID="1" presetClass="entr" presetSubtype="0" fill="hold" grpId="0" nodeType="clickEffect">
+                                <p:cTn id="13" presetID="1" presetClass="entr" presetSubtype="0" fill="hold" nodeType="withEffect">
                                   <p:stCondLst>
                                     <p:cond delay="0"/>
                                   </p:stCondLst>
@@ -8165,11 +9327,7 @@
                                           </p:stCondLst>
                                         </p:cTn>
                                         <p:tgtEl>
-                                          <p:spTgt spid="3">
-                                            <p:txEl>
-                                              <p:pRg st="2" end="2"/>
-                                            </p:txEl>
-                                          </p:spTgt>
+                                          <p:spTgt spid="42"/>
                                         </p:tgtEl>
                                         <p:attrNameLst>
                                           <p:attrName>style.visibility</p:attrName>
@@ -8216,9 +9374,36 @@
                                         <p:tgtEl>
                                           <p:spTgt spid="3">
                                             <p:txEl>
-                                              <p:pRg st="3" end="3"/>
+                                              <p:pRg st="2" end="2"/>
                                             </p:txEl>
                                           </p:spTgt>
+                                        </p:tgtEl>
+                                        <p:attrNameLst>
+                                          <p:attrName>style.visibility</p:attrName>
+                                        </p:attrNameLst>
+                                      </p:cBhvr>
+                                      <p:to>
+                                        <p:strVal val="visible"/>
+                                      </p:to>
+                                    </p:set>
+                                  </p:childTnLst>
+                                </p:cTn>
+                              </p:par>
+                              <p:par>
+                                <p:cTn id="19" presetID="1" presetClass="entr" presetSubtype="0" fill="hold" nodeType="withEffect">
+                                  <p:stCondLst>
+                                    <p:cond delay="0"/>
+                                  </p:stCondLst>
+                                  <p:childTnLst>
+                                    <p:set>
+                                      <p:cBhvr>
+                                        <p:cTn id="20" dur="1" fill="hold">
+                                          <p:stCondLst>
+                                            <p:cond delay="0"/>
+                                          </p:stCondLst>
+                                        </p:cTn>
+                                        <p:tgtEl>
+                                          <p:spTgt spid="38"/>
                                         </p:tgtEl>
                                         <p:attrNameLst>
                                           <p:attrName>style.visibility</p:attrName>
@@ -8238,26 +9423,102 @@
                     </p:cTn>
                   </p:par>
                   <p:par>
-                    <p:cTn id="19" fill="hold">
+                    <p:cTn id="21" fill="hold">
                       <p:stCondLst>
                         <p:cond delay="indefinite"/>
                       </p:stCondLst>
                       <p:childTnLst>
                         <p:par>
-                          <p:cTn id="20" fill="hold">
+                          <p:cTn id="22" fill="hold">
                             <p:stCondLst>
                               <p:cond delay="0"/>
                             </p:stCondLst>
                             <p:childTnLst>
                               <p:par>
-                                <p:cTn id="21" presetID="1" presetClass="entr" presetSubtype="0" fill="hold" grpId="0" nodeType="clickEffect">
+                                <p:cTn id="23" presetID="1" presetClass="entr" presetSubtype="0" fill="hold" grpId="0" nodeType="clickEffect">
                                   <p:stCondLst>
                                     <p:cond delay="0"/>
                                   </p:stCondLst>
                                   <p:childTnLst>
                                     <p:set>
                                       <p:cBhvr>
-                                        <p:cTn id="22" dur="1" fill="hold">
+                                        <p:cTn id="24" dur="1" fill="hold">
+                                          <p:stCondLst>
+                                            <p:cond delay="0"/>
+                                          </p:stCondLst>
+                                        </p:cTn>
+                                        <p:tgtEl>
+                                          <p:spTgt spid="3">
+                                            <p:txEl>
+                                              <p:pRg st="3" end="3"/>
+                                            </p:txEl>
+                                          </p:spTgt>
+                                        </p:tgtEl>
+                                        <p:attrNameLst>
+                                          <p:attrName>style.visibility</p:attrName>
+                                        </p:attrNameLst>
+                                      </p:cBhvr>
+                                      <p:to>
+                                        <p:strVal val="visible"/>
+                                      </p:to>
+                                    </p:set>
+                                  </p:childTnLst>
+                                </p:cTn>
+                              </p:par>
+                              <p:par>
+                                <p:cTn id="25" presetID="1" presetClass="entr" presetSubtype="0" fill="hold" nodeType="withEffect">
+                                  <p:stCondLst>
+                                    <p:cond delay="0"/>
+                                  </p:stCondLst>
+                                  <p:childTnLst>
+                                    <p:set>
+                                      <p:cBhvr>
+                                        <p:cTn id="26" dur="1" fill="hold">
+                                          <p:stCondLst>
+                                            <p:cond delay="0"/>
+                                          </p:stCondLst>
+                                        </p:cTn>
+                                        <p:tgtEl>
+                                          <p:spTgt spid="46"/>
+                                        </p:tgtEl>
+                                        <p:attrNameLst>
+                                          <p:attrName>style.visibility</p:attrName>
+                                        </p:attrNameLst>
+                                      </p:cBhvr>
+                                      <p:to>
+                                        <p:strVal val="visible"/>
+                                      </p:to>
+                                    </p:set>
+                                  </p:childTnLst>
+                                </p:cTn>
+                              </p:par>
+                            </p:childTnLst>
+                          </p:cTn>
+                        </p:par>
+                      </p:childTnLst>
+                    </p:cTn>
+                  </p:par>
+                  <p:par>
+                    <p:cTn id="27" fill="hold">
+                      <p:stCondLst>
+                        <p:cond delay="indefinite"/>
+                      </p:stCondLst>
+                      <p:childTnLst>
+                        <p:par>
+                          <p:cTn id="28" fill="hold">
+                            <p:stCondLst>
+                              <p:cond delay="0"/>
+                            </p:stCondLst>
+                            <p:childTnLst>
+                              <p:par>
+                                <p:cTn id="29" presetID="1" presetClass="entr" presetSubtype="0" fill="hold" grpId="0" nodeType="clickEffect">
+                                  <p:stCondLst>
+                                    <p:cond delay="0"/>
+                                  </p:stCondLst>
+                                  <p:childTnLst>
+                                    <p:set>
+                                      <p:cBhvr>
+                                        <p:cTn id="30" dur="1" fill="hold">
                                           <p:stCondLst>
                                             <p:cond delay="0"/>
                                           </p:stCondLst>
@@ -8280,6 +9541,33 @@
                                   </p:childTnLst>
                                 </p:cTn>
                               </p:par>
+                              <p:par>
+                                <p:cTn id="31" presetID="1" presetClass="entr" presetSubtype="0" fill="hold" nodeType="withEffect">
+                                  <p:stCondLst>
+                                    <p:cond delay="0"/>
+                                  </p:stCondLst>
+                                  <p:childTnLst>
+                                    <p:set>
+                                      <p:cBhvr>
+                                        <p:cTn id="32" dur="1" fill="hold">
+                                          <p:stCondLst>
+                                            <p:cond delay="0"/>
+                                          </p:stCondLst>
+                                        </p:cTn>
+                                        <p:tgtEl>
+                                          <p:spTgt spid="50"/>
+                                        </p:tgtEl>
+                                        <p:attrNameLst>
+                                          <p:attrName>style.visibility</p:attrName>
+                                        </p:attrNameLst>
+                                      </p:cBhvr>
+                                      <p:to>
+                                        <p:strVal val="visible"/>
+                                      </p:to>
+                                    </p:set>
+                                  </p:childTnLst>
+                                </p:cTn>
+                              </p:par>
                             </p:childTnLst>
                           </p:cTn>
                         </p:par>
@@ -8287,32 +9575,32 @@
                     </p:cTn>
                   </p:par>
                   <p:par>
-                    <p:cTn id="23" fill="hold">
+                    <p:cTn id="33" fill="hold">
                       <p:stCondLst>
                         <p:cond delay="indefinite"/>
                       </p:stCondLst>
                       <p:childTnLst>
                         <p:par>
-                          <p:cTn id="24" fill="hold">
+                          <p:cTn id="34" fill="hold">
                             <p:stCondLst>
                               <p:cond delay="0"/>
                             </p:stCondLst>
                             <p:childTnLst>
                               <p:par>
-                                <p:cTn id="25" presetID="1" presetClass="entr" presetSubtype="0" fill="hold" grpId="0" nodeType="clickEffect">
+                                <p:cTn id="35" presetID="1" presetClass="entr" presetSubtype="0" fill="hold" nodeType="clickEffect">
                                   <p:stCondLst>
                                     <p:cond delay="0"/>
                                   </p:stCondLst>
                                   <p:childTnLst>
                                     <p:set>
                                       <p:cBhvr>
-                                        <p:cTn id="26" dur="1" fill="hold">
+                                        <p:cTn id="36" dur="1" fill="hold">
                                           <p:stCondLst>
                                             <p:cond delay="0"/>
                                           </p:stCondLst>
                                         </p:cTn>
                                         <p:tgtEl>
-                                          <p:spTgt spid="56"/>
+                                          <p:spTgt spid="34"/>
                                         </p:tgtEl>
                                         <p:attrNameLst>
                                           <p:attrName>style.visibility</p:attrName>
@@ -8353,8 +9641,7 @@
       </p:par>
     </p:tnLst>
     <p:bldLst>
-      <p:bldP spid="3" grpId="0" build="p"/>
-      <p:bldP spid="56" grpId="0" animBg="1"/>
+      <p:bldP spid="3" grpId="0" uiExpand="1" build="p"/>
     </p:bldLst>
   </p:timing>
 </p:sld>
@@ -8410,10 +9697,15 @@
             <p:ph idx="1"/>
           </p:nvPr>
         </p:nvSpPr>
-        <p:spPr/>
+        <p:spPr>
+          <a:xfrm>
+            <a:off x="457200" y="1600200"/>
+            <a:ext cx="8229600" cy="4925144"/>
+          </a:xfrm>
+        </p:spPr>
         <p:txBody>
           <a:bodyPr>
-            <a:normAutofit fontScale="92500" lnSpcReduction="20000"/>
+            <a:normAutofit fontScale="85000" lnSpcReduction="10000"/>
           </a:bodyPr>
           <a:lstStyle/>
           <a:p>
@@ -8447,15 +9739,7 @@
             </a:r>
             <a:r>
               <a:rPr lang="en-US" dirty="0" smtClean="0"/>
-              <a:t>: send a possibly unique message from </a:t>
-            </a:r>
-            <a:r>
-              <a:rPr lang="en-US" dirty="0" smtClean="0"/>
-              <a:t>root to </a:t>
-            </a:r>
-            <a:r>
-              <a:rPr lang="en-US" dirty="0" smtClean="0"/>
-              <a:t>all members </a:t>
+              <a:t>: send a possibly unique message from root to all members </a:t>
             </a:r>
           </a:p>
           <a:p>
@@ -8490,11 +9774,17 @@
           <a:p>
             <a:r>
               <a:rPr lang="en-US" dirty="0" smtClean="0"/>
-              <a:t>Synchronizes </a:t>
-            </a:r>
-            <a:r>
-              <a:rPr lang="en-US" dirty="0" smtClean="0"/>
-              <a:t>processes (MPI-2.1)</a:t>
+              <a:t>Synchronizes processes (MPI-2.2)</a:t>
+            </a:r>
+          </a:p>
+          <a:p>
+            <a:r>
+              <a:rPr lang="en-US" dirty="0" smtClean="0"/>
+              <a:t>Optimization opportunities for library </a:t>
+            </a:r>
+            <a:r>
+              <a:rPr lang="en-US" dirty="0" err="1" smtClean="0"/>
+              <a:t>implemntors</a:t>
             </a:r>
             <a:endParaRPr lang="nl-BE" dirty="0"/>
           </a:p>
@@ -8522,6 +9812,9 @@
                     <p:cTn id="3" fill="hold">
                       <p:stCondLst>
                         <p:cond delay="indefinite"/>
+                        <p:cond evt="onBegin" delay="0">
+                          <p:tn val="2"/>
+                        </p:cond>
                       </p:stCondLst>
                       <p:childTnLst>
                         <p:par>
@@ -8531,7 +9824,7 @@
                             </p:stCondLst>
                             <p:childTnLst>
                               <p:par>
-                                <p:cTn id="5" presetID="1" presetClass="entr" presetSubtype="0" fill="hold" grpId="0" nodeType="clickEffect">
+                                <p:cTn id="5" presetID="1" presetClass="entr" presetSubtype="0" fill="hold" grpId="0" nodeType="withEffect">
                                   <p:stCondLst>
                                     <p:cond delay="0"/>
                                   </p:stCondLst>
@@ -8820,6 +10113,55 @@
                       </p:childTnLst>
                     </p:cTn>
                   </p:par>
+                  <p:par>
+                    <p:cTn id="25" fill="hold">
+                      <p:stCondLst>
+                        <p:cond delay="indefinite"/>
+                      </p:stCondLst>
+                      <p:childTnLst>
+                        <p:par>
+                          <p:cTn id="26" fill="hold">
+                            <p:stCondLst>
+                              <p:cond delay="0"/>
+                            </p:stCondLst>
+                            <p:childTnLst>
+                              <p:par>
+                                <p:cTn id="27" presetID="1" presetClass="entr" presetSubtype="0" fill="hold" grpId="0" nodeType="clickEffect">
+                                  <p:stCondLst>
+                                    <p:cond delay="0"/>
+                                  </p:stCondLst>
+                                  <p:childTnLst>
+                                    <p:set>
+                                      <p:cBhvr>
+                                        <p:cTn id="28" dur="1" fill="hold">
+                                          <p:stCondLst>
+                                            <p:cond delay="0"/>
+                                          </p:stCondLst>
+                                        </p:cTn>
+                                        <p:tgtEl>
+                                          <p:spTgt spid="3">
+                                            <p:txEl>
+                                              <p:pRg st="8" end="8"/>
+                                            </p:txEl>
+                                          </p:spTgt>
+                                        </p:tgtEl>
+                                        <p:attrNameLst>
+                                          <p:attrName>style.visibility</p:attrName>
+                                        </p:attrNameLst>
+                                      </p:cBhvr>
+                                      <p:to>
+                                        <p:strVal val="visible"/>
+                                      </p:to>
+                                    </p:set>
+                                  </p:childTnLst>
+                                </p:cTn>
+                              </p:par>
+                            </p:childTnLst>
+                          </p:cTn>
+                        </p:par>
+                      </p:childTnLst>
+                    </p:cTn>
+                  </p:par>
                 </p:childTnLst>
               </p:cTn>
               <p:prevCondLst>
@@ -8842,7 +10184,7 @@
       </p:par>
     </p:tnLst>
     <p:bldLst>
-      <p:bldP spid="3" grpId="0" build="p"/>
+      <p:bldP spid="3" grpId="0" uiExpand="1" build="p"/>
     </p:bldLst>
   </p:timing>
 </p:sld>
@@ -10753,7 +12095,7 @@
         <p:spPr/>
         <p:txBody>
           <a:bodyPr>
-            <a:normAutofit/>
+            <a:normAutofit lnSpcReduction="10000"/>
           </a:bodyPr>
           <a:lstStyle/>
           <a:p>
@@ -10766,7 +12108,7 @@
             <a:pPr lvl="1"/>
             <a:r>
               <a:rPr lang="en-US" dirty="0" smtClean="0"/>
-              <a:t>very large data structures (typically multidimensional matrices)</a:t>
+              <a:t>very large data structures (typically multidimensional arrays)</a:t>
             </a:r>
           </a:p>
           <a:p>
@@ -10784,6 +12126,12 @@
           </a:p>
           <a:p>
             <a:pPr lvl="1"/>
+            <a:r>
+              <a:rPr lang="en-US" dirty="0" smtClean="0"/>
+              <a:t>exchange of data, state</a:t>
+            </a:r>
+          </a:p>
+          <a:p>
             <a:r>
               <a:rPr lang="en-US" dirty="0" smtClean="0"/>
               <a:t>Need for standardization: </a:t>
@@ -10821,6 +12169,9 @@
                     <p:cTn id="3" fill="hold">
                       <p:stCondLst>
                         <p:cond delay="indefinite"/>
+                        <p:cond evt="onBegin" delay="0">
+                          <p:tn val="2"/>
+                        </p:cond>
                       </p:stCondLst>
                       <p:childTnLst>
                         <p:par>
@@ -10830,7 +12181,7 @@
                             </p:stCondLst>
                             <p:childTnLst>
                               <p:par>
-                                <p:cTn id="5" presetID="1" presetClass="entr" presetSubtype="0" fill="hold" grpId="0" nodeType="clickEffect">
+                                <p:cTn id="5" presetID="1" presetClass="entr" presetSubtype="0" fill="hold" grpId="0" nodeType="withEffect">
                                   <p:stCondLst>
                                     <p:cond delay="0"/>
                                   </p:stCondLst>
@@ -11008,6 +12359,55 @@
                       </p:childTnLst>
                     </p:cTn>
                   </p:par>
+                  <p:par>
+                    <p:cTn id="17" fill="hold">
+                      <p:stCondLst>
+                        <p:cond delay="indefinite"/>
+                      </p:stCondLst>
+                      <p:childTnLst>
+                        <p:par>
+                          <p:cTn id="18" fill="hold">
+                            <p:stCondLst>
+                              <p:cond delay="0"/>
+                            </p:stCondLst>
+                            <p:childTnLst>
+                              <p:par>
+                                <p:cTn id="19" presetID="1" presetClass="entr" presetSubtype="0" fill="hold" grpId="0" nodeType="clickEffect">
+                                  <p:stCondLst>
+                                    <p:cond delay="0"/>
+                                  </p:stCondLst>
+                                  <p:childTnLst>
+                                    <p:set>
+                                      <p:cBhvr>
+                                        <p:cTn id="20" dur="1" fill="hold">
+                                          <p:stCondLst>
+                                            <p:cond delay="0"/>
+                                          </p:stCondLst>
+                                        </p:cTn>
+                                        <p:tgtEl>
+                                          <p:spTgt spid="3">
+                                            <p:txEl>
+                                              <p:pRg st="5" end="5"/>
+                                            </p:txEl>
+                                          </p:spTgt>
+                                        </p:tgtEl>
+                                        <p:attrNameLst>
+                                          <p:attrName>style.visibility</p:attrName>
+                                        </p:attrNameLst>
+                                      </p:cBhvr>
+                                      <p:to>
+                                        <p:strVal val="visible"/>
+                                      </p:to>
+                                    </p:set>
+                                  </p:childTnLst>
+                                </p:cTn>
+                              </p:par>
+                            </p:childTnLst>
+                          </p:cTn>
+                        </p:par>
+                      </p:childTnLst>
+                    </p:cTn>
+                  </p:par>
                 </p:childTnLst>
               </p:cTn>
               <p:prevCondLst>
@@ -11030,7 +12430,7 @@
       </p:par>
     </p:tnLst>
     <p:bldLst>
-      <p:bldP spid="3" grpId="0" build="p"/>
+      <p:bldP spid="3" grpId="0" uiExpand="1" build="p"/>
     </p:bldLst>
   </p:timing>
 </p:sld>
@@ -13523,7 +14923,7 @@
           <a:p>
             <a:r>
               <a:rPr lang="en-US" dirty="0" smtClean="0"/>
-              <a:t>User defined</a:t>
+              <a:t>User defined (must be associative!)</a:t>
             </a:r>
           </a:p>
         </p:txBody>
@@ -13541,9 +14941,358 @@
   <p:timing>
     <p:tnLst>
       <p:par>
-        <p:cTn id="1" dur="indefinite" restart="never" nodeType="tmRoot"/>
+        <p:cTn id="1" dur="indefinite" restart="never" nodeType="tmRoot">
+          <p:childTnLst>
+            <p:seq concurrent="1" nextAc="seek">
+              <p:cTn id="2" dur="indefinite" nodeType="mainSeq">
+                <p:childTnLst>
+                  <p:par>
+                    <p:cTn id="3" fill="hold">
+                      <p:stCondLst>
+                        <p:cond delay="indefinite"/>
+                        <p:cond evt="onBegin" delay="0">
+                          <p:tn val="2"/>
+                        </p:cond>
+                      </p:stCondLst>
+                      <p:childTnLst>
+                        <p:par>
+                          <p:cTn id="4" fill="hold">
+                            <p:stCondLst>
+                              <p:cond delay="0"/>
+                            </p:stCondLst>
+                            <p:childTnLst>
+                              <p:par>
+                                <p:cTn id="5" presetID="1" presetClass="entr" presetSubtype="0" fill="hold" grpId="0" nodeType="withEffect">
+                                  <p:stCondLst>
+                                    <p:cond delay="0"/>
+                                  </p:stCondLst>
+                                  <p:childTnLst>
+                                    <p:set>
+                                      <p:cBhvr>
+                                        <p:cTn id="6" dur="1" fill="hold">
+                                          <p:stCondLst>
+                                            <p:cond delay="0"/>
+                                          </p:stCondLst>
+                                        </p:cTn>
+                                        <p:tgtEl>
+                                          <p:spTgt spid="3">
+                                            <p:txEl>
+                                              <p:pRg st="0" end="0"/>
+                                            </p:txEl>
+                                          </p:spTgt>
+                                        </p:tgtEl>
+                                        <p:attrNameLst>
+                                          <p:attrName>style.visibility</p:attrName>
+                                        </p:attrNameLst>
+                                      </p:cBhvr>
+                                      <p:to>
+                                        <p:strVal val="visible"/>
+                                      </p:to>
+                                    </p:set>
+                                  </p:childTnLst>
+                                </p:cTn>
+                              </p:par>
+                              <p:par>
+                                <p:cTn id="7" presetID="1" presetClass="entr" presetSubtype="0" fill="hold" grpId="0" nodeType="withEffect">
+                                  <p:stCondLst>
+                                    <p:cond delay="0"/>
+                                  </p:stCondLst>
+                                  <p:childTnLst>
+                                    <p:set>
+                                      <p:cBhvr>
+                                        <p:cTn id="8" dur="1" fill="hold">
+                                          <p:stCondLst>
+                                            <p:cond delay="0"/>
+                                          </p:stCondLst>
+                                        </p:cTn>
+                                        <p:tgtEl>
+                                          <p:spTgt spid="3">
+                                            <p:txEl>
+                                              <p:pRg st="1" end="1"/>
+                                            </p:txEl>
+                                          </p:spTgt>
+                                        </p:tgtEl>
+                                        <p:attrNameLst>
+                                          <p:attrName>style.visibility</p:attrName>
+                                        </p:attrNameLst>
+                                      </p:cBhvr>
+                                      <p:to>
+                                        <p:strVal val="visible"/>
+                                      </p:to>
+                                    </p:set>
+                                  </p:childTnLst>
+                                </p:cTn>
+                              </p:par>
+                              <p:par>
+                                <p:cTn id="9" presetID="1" presetClass="entr" presetSubtype="0" fill="hold" grpId="0" nodeType="withEffect">
+                                  <p:stCondLst>
+                                    <p:cond delay="0"/>
+                                  </p:stCondLst>
+                                  <p:childTnLst>
+                                    <p:set>
+                                      <p:cBhvr>
+                                        <p:cTn id="10" dur="1" fill="hold">
+                                          <p:stCondLst>
+                                            <p:cond delay="0"/>
+                                          </p:stCondLst>
+                                        </p:cTn>
+                                        <p:tgtEl>
+                                          <p:spTgt spid="3">
+                                            <p:txEl>
+                                              <p:pRg st="2" end="2"/>
+                                            </p:txEl>
+                                          </p:spTgt>
+                                        </p:tgtEl>
+                                        <p:attrNameLst>
+                                          <p:attrName>style.visibility</p:attrName>
+                                        </p:attrNameLst>
+                                      </p:cBhvr>
+                                      <p:to>
+                                        <p:strVal val="visible"/>
+                                      </p:to>
+                                    </p:set>
+                                  </p:childTnLst>
+                                </p:cTn>
+                              </p:par>
+                            </p:childTnLst>
+                          </p:cTn>
+                        </p:par>
+                      </p:childTnLst>
+                    </p:cTn>
+                  </p:par>
+                  <p:par>
+                    <p:cTn id="11" fill="hold">
+                      <p:stCondLst>
+                        <p:cond delay="indefinite"/>
+                      </p:stCondLst>
+                      <p:childTnLst>
+                        <p:par>
+                          <p:cTn id="12" fill="hold">
+                            <p:stCondLst>
+                              <p:cond delay="0"/>
+                            </p:stCondLst>
+                            <p:childTnLst>
+                              <p:par>
+                                <p:cTn id="13" presetID="1" presetClass="entr" presetSubtype="0" fill="hold" grpId="0" nodeType="clickEffect">
+                                  <p:stCondLst>
+                                    <p:cond delay="0"/>
+                                  </p:stCondLst>
+                                  <p:childTnLst>
+                                    <p:set>
+                                      <p:cBhvr>
+                                        <p:cTn id="14" dur="1" fill="hold">
+                                          <p:stCondLst>
+                                            <p:cond delay="0"/>
+                                          </p:stCondLst>
+                                        </p:cTn>
+                                        <p:tgtEl>
+                                          <p:spTgt spid="3">
+                                            <p:txEl>
+                                              <p:pRg st="3" end="3"/>
+                                            </p:txEl>
+                                          </p:spTgt>
+                                        </p:tgtEl>
+                                        <p:attrNameLst>
+                                          <p:attrName>style.visibility</p:attrName>
+                                        </p:attrNameLst>
+                                      </p:cBhvr>
+                                      <p:to>
+                                        <p:strVal val="visible"/>
+                                      </p:to>
+                                    </p:set>
+                                  </p:childTnLst>
+                                </p:cTn>
+                              </p:par>
+                              <p:par>
+                                <p:cTn id="15" presetID="1" presetClass="entr" presetSubtype="0" fill="hold" grpId="0" nodeType="withEffect">
+                                  <p:stCondLst>
+                                    <p:cond delay="0"/>
+                                  </p:stCondLst>
+                                  <p:childTnLst>
+                                    <p:set>
+                                      <p:cBhvr>
+                                        <p:cTn id="16" dur="1" fill="hold">
+                                          <p:stCondLst>
+                                            <p:cond delay="0"/>
+                                          </p:stCondLst>
+                                        </p:cTn>
+                                        <p:tgtEl>
+                                          <p:spTgt spid="3">
+                                            <p:txEl>
+                                              <p:pRg st="4" end="4"/>
+                                            </p:txEl>
+                                          </p:spTgt>
+                                        </p:tgtEl>
+                                        <p:attrNameLst>
+                                          <p:attrName>style.visibility</p:attrName>
+                                        </p:attrNameLst>
+                                      </p:cBhvr>
+                                      <p:to>
+                                        <p:strVal val="visible"/>
+                                      </p:to>
+                                    </p:set>
+                                  </p:childTnLst>
+                                </p:cTn>
+                              </p:par>
+                            </p:childTnLst>
+                          </p:cTn>
+                        </p:par>
+                      </p:childTnLst>
+                    </p:cTn>
+                  </p:par>
+                  <p:par>
+                    <p:cTn id="17" fill="hold">
+                      <p:stCondLst>
+                        <p:cond delay="indefinite"/>
+                      </p:stCondLst>
+                      <p:childTnLst>
+                        <p:par>
+                          <p:cTn id="18" fill="hold">
+                            <p:stCondLst>
+                              <p:cond delay="0"/>
+                            </p:stCondLst>
+                            <p:childTnLst>
+                              <p:par>
+                                <p:cTn id="19" presetID="1" presetClass="entr" presetSubtype="0" fill="hold" grpId="0" nodeType="clickEffect">
+                                  <p:stCondLst>
+                                    <p:cond delay="0"/>
+                                  </p:stCondLst>
+                                  <p:childTnLst>
+                                    <p:set>
+                                      <p:cBhvr>
+                                        <p:cTn id="20" dur="1" fill="hold">
+                                          <p:stCondLst>
+                                            <p:cond delay="0"/>
+                                          </p:stCondLst>
+                                        </p:cTn>
+                                        <p:tgtEl>
+                                          <p:spTgt spid="3">
+                                            <p:txEl>
+                                              <p:pRg st="5" end="5"/>
+                                            </p:txEl>
+                                          </p:spTgt>
+                                        </p:tgtEl>
+                                        <p:attrNameLst>
+                                          <p:attrName>style.visibility</p:attrName>
+                                        </p:attrNameLst>
+                                      </p:cBhvr>
+                                      <p:to>
+                                        <p:strVal val="visible"/>
+                                      </p:to>
+                                    </p:set>
+                                  </p:childTnLst>
+                                </p:cTn>
+                              </p:par>
+                              <p:par>
+                                <p:cTn id="21" presetID="1" presetClass="entr" presetSubtype="0" fill="hold" grpId="0" nodeType="withEffect">
+                                  <p:stCondLst>
+                                    <p:cond delay="0"/>
+                                  </p:stCondLst>
+                                  <p:childTnLst>
+                                    <p:set>
+                                      <p:cBhvr>
+                                        <p:cTn id="22" dur="1" fill="hold">
+                                          <p:stCondLst>
+                                            <p:cond delay="0"/>
+                                          </p:stCondLst>
+                                        </p:cTn>
+                                        <p:tgtEl>
+                                          <p:spTgt spid="3">
+                                            <p:txEl>
+                                              <p:pRg st="6" end="6"/>
+                                            </p:txEl>
+                                          </p:spTgt>
+                                        </p:tgtEl>
+                                        <p:attrNameLst>
+                                          <p:attrName>style.visibility</p:attrName>
+                                        </p:attrNameLst>
+                                      </p:cBhvr>
+                                      <p:to>
+                                        <p:strVal val="visible"/>
+                                      </p:to>
+                                    </p:set>
+                                  </p:childTnLst>
+                                </p:cTn>
+                              </p:par>
+                            </p:childTnLst>
+                          </p:cTn>
+                        </p:par>
+                      </p:childTnLst>
+                    </p:cTn>
+                  </p:par>
+                  <p:par>
+                    <p:cTn id="23" fill="hold">
+                      <p:stCondLst>
+                        <p:cond delay="indefinite"/>
+                      </p:stCondLst>
+                      <p:childTnLst>
+                        <p:par>
+                          <p:cTn id="24" fill="hold">
+                            <p:stCondLst>
+                              <p:cond delay="0"/>
+                            </p:stCondLst>
+                            <p:childTnLst>
+                              <p:par>
+                                <p:cTn id="25" presetID="1" presetClass="entr" presetSubtype="0" fill="hold" grpId="0" nodeType="clickEffect">
+                                  <p:stCondLst>
+                                    <p:cond delay="0"/>
+                                  </p:stCondLst>
+                                  <p:childTnLst>
+                                    <p:set>
+                                      <p:cBhvr>
+                                        <p:cTn id="26" dur="1" fill="hold">
+                                          <p:stCondLst>
+                                            <p:cond delay="0"/>
+                                          </p:stCondLst>
+                                        </p:cTn>
+                                        <p:tgtEl>
+                                          <p:spTgt spid="3">
+                                            <p:txEl>
+                                              <p:pRg st="7" end="7"/>
+                                            </p:txEl>
+                                          </p:spTgt>
+                                        </p:tgtEl>
+                                        <p:attrNameLst>
+                                          <p:attrName>style.visibility</p:attrName>
+                                        </p:attrNameLst>
+                                      </p:cBhvr>
+                                      <p:to>
+                                        <p:strVal val="visible"/>
+                                      </p:to>
+                                    </p:set>
+                                  </p:childTnLst>
+                                </p:cTn>
+                              </p:par>
+                            </p:childTnLst>
+                          </p:cTn>
+                        </p:par>
+                      </p:childTnLst>
+                    </p:cTn>
+                  </p:par>
+                </p:childTnLst>
+              </p:cTn>
+              <p:prevCondLst>
+                <p:cond evt="onPrev" delay="0">
+                  <p:tgtEl>
+                    <p:sldTgt/>
+                  </p:tgtEl>
+                </p:cond>
+              </p:prevCondLst>
+              <p:nextCondLst>
+                <p:cond evt="onNext" delay="0">
+                  <p:tgtEl>
+                    <p:sldTgt/>
+                  </p:tgtEl>
+                </p:cond>
+              </p:nextCondLst>
+            </p:seq>
+          </p:childTnLst>
+        </p:cTn>
       </p:par>
     </p:tnLst>
+    <p:bldLst>
+      <p:bldP spid="3" grpId="0" uiExpand="1" build="p"/>
+    </p:bldLst>
   </p:timing>
 </p:sld>
 </file>
@@ -13957,7 +15706,12 @@
             <p:ph idx="1"/>
           </p:nvPr>
         </p:nvSpPr>
-        <p:spPr/>
+        <p:spPr>
+          <a:xfrm>
+            <a:off x="457200" y="1600200"/>
+            <a:ext cx="8229600" cy="4781128"/>
+          </a:xfrm>
+        </p:spPr>
         <p:txBody>
           <a:bodyPr>
             <a:normAutofit lnSpcReduction="10000"/>
@@ -13995,15 +15749,15 @@
           <a:p>
             <a:r>
               <a:rPr lang="en-US" dirty="0" smtClean="0"/>
-              <a:t>MPI allows to </a:t>
-            </a:r>
-            <a:r>
-              <a:rPr lang="en-US" dirty="0" smtClean="0"/>
-              <a:t>"arrange" </a:t>
-            </a:r>
-            <a:r>
-              <a:rPr lang="en-US" dirty="0" smtClean="0"/>
-              <a:t>processes in 1D, 2D, or 3D grids</a:t>
+              <a:t>MPI allows to "arrange" processes in 1D, 2D, 3D, … grids, i.e., </a:t>
+            </a:r>
+            <a:r>
+              <a:rPr lang="en-US" dirty="0" err="1" smtClean="0"/>
+              <a:t>carthesian</a:t>
+            </a:r>
+            <a:r>
+              <a:rPr lang="en-US" dirty="0" smtClean="0"/>
+              <a:t> topology</a:t>
             </a:r>
           </a:p>
           <a:p>
@@ -14011,6 +15765,13 @@
             <a:r>
               <a:rPr lang="en-US" dirty="0" smtClean="0"/>
               <a:t>easy to determine neighbors</a:t>
+            </a:r>
+          </a:p>
+          <a:p>
+            <a:pPr lvl="1"/>
+            <a:r>
+              <a:rPr lang="en-US" dirty="0" smtClean="0"/>
+              <a:t>new communicator</a:t>
             </a:r>
           </a:p>
         </p:txBody>
@@ -14165,6 +15926,9 @@
                     <p:cTn id="3" fill="hold">
                       <p:stCondLst>
                         <p:cond delay="indefinite"/>
+                        <p:cond evt="onBegin" delay="0">
+                          <p:tn val="2"/>
+                        </p:cond>
                       </p:stCondLst>
                       <p:childTnLst>
                         <p:par>
@@ -14174,7 +15938,7 @@
                             </p:stCondLst>
                             <p:childTnLst>
                               <p:par>
-                                <p:cTn id="5" presetID="1" presetClass="entr" presetSubtype="0" fill="hold" grpId="0" nodeType="clickEffect">
+                                <p:cTn id="5" presetID="1" presetClass="entr" presetSubtype="0" fill="hold" grpId="0" nodeType="withEffect">
                                   <p:stCondLst>
                                     <p:cond delay="0"/>
                                   </p:stCondLst>
@@ -14418,6 +16182,37 @@
                                   </p:childTnLst>
                                 </p:cTn>
                               </p:par>
+                              <p:par>
+                                <p:cTn id="23" presetID="1" presetClass="entr" presetSubtype="0" fill="hold" grpId="0" nodeType="withEffect">
+                                  <p:stCondLst>
+                                    <p:cond delay="0"/>
+                                  </p:stCondLst>
+                                  <p:childTnLst>
+                                    <p:set>
+                                      <p:cBhvr>
+                                        <p:cTn id="24" dur="1" fill="hold">
+                                          <p:stCondLst>
+                                            <p:cond delay="0"/>
+                                          </p:stCondLst>
+                                        </p:cTn>
+                                        <p:tgtEl>
+                                          <p:spTgt spid="3">
+                                            <p:txEl>
+                                              <p:pRg st="7" end="7"/>
+                                            </p:txEl>
+                                          </p:spTgt>
+                                        </p:tgtEl>
+                                        <p:attrNameLst>
+                                          <p:attrName>style.visibility</p:attrName>
+                                        </p:attrNameLst>
+                                      </p:cBhvr>
+                                      <p:to>
+                                        <p:strVal val="visible"/>
+                                      </p:to>
+                                    </p:set>
+                                  </p:childTnLst>
+                                </p:cTn>
+                              </p:par>
                             </p:childTnLst>
                           </p:cTn>
                         </p:par>
@@ -14567,7 +16362,7 @@
           <a:p>
             <a:r>
               <a:rPr lang="en-US" dirty="0" smtClean="0"/>
-              <a:t>Similar</a:t>
+              <a:t>Similar to communication</a:t>
             </a:r>
           </a:p>
           <a:p>
@@ -14619,9 +16414,345 @@
   <p:timing>
     <p:tnLst>
       <p:par>
-        <p:cTn id="1" dur="indefinite" restart="never" nodeType="tmRoot"/>
+        <p:cTn id="1" dur="indefinite" restart="never" nodeType="tmRoot">
+          <p:childTnLst>
+            <p:seq concurrent="1" nextAc="seek">
+              <p:cTn id="2" dur="indefinite" nodeType="mainSeq">
+                <p:childTnLst>
+                  <p:par>
+                    <p:cTn id="3" fill="hold">
+                      <p:stCondLst>
+                        <p:cond delay="indefinite"/>
+                        <p:cond evt="onBegin" delay="0">
+                          <p:tn val="2"/>
+                        </p:cond>
+                      </p:stCondLst>
+                      <p:childTnLst>
+                        <p:par>
+                          <p:cTn id="4" fill="hold">
+                            <p:stCondLst>
+                              <p:cond delay="0"/>
+                            </p:stCondLst>
+                            <p:childTnLst>
+                              <p:par>
+                                <p:cTn id="5" presetID="1" presetClass="entr" presetSubtype="0" fill="hold" grpId="0" nodeType="withEffect">
+                                  <p:stCondLst>
+                                    <p:cond delay="0"/>
+                                  </p:stCondLst>
+                                  <p:childTnLst>
+                                    <p:set>
+                                      <p:cBhvr>
+                                        <p:cTn id="6" dur="1" fill="hold">
+                                          <p:stCondLst>
+                                            <p:cond delay="0"/>
+                                          </p:stCondLst>
+                                        </p:cTn>
+                                        <p:tgtEl>
+                                          <p:spTgt spid="3">
+                                            <p:txEl>
+                                              <p:pRg st="0" end="0"/>
+                                            </p:txEl>
+                                          </p:spTgt>
+                                        </p:tgtEl>
+                                        <p:attrNameLst>
+                                          <p:attrName>style.visibility</p:attrName>
+                                        </p:attrNameLst>
+                                      </p:cBhvr>
+                                      <p:to>
+                                        <p:strVal val="visible"/>
+                                      </p:to>
+                                    </p:set>
+                                  </p:childTnLst>
+                                </p:cTn>
+                              </p:par>
+                            </p:childTnLst>
+                          </p:cTn>
+                        </p:par>
+                      </p:childTnLst>
+                    </p:cTn>
+                  </p:par>
+                  <p:par>
+                    <p:cTn id="7" fill="hold">
+                      <p:stCondLst>
+                        <p:cond delay="indefinite"/>
+                      </p:stCondLst>
+                      <p:childTnLst>
+                        <p:par>
+                          <p:cTn id="8" fill="hold">
+                            <p:stCondLst>
+                              <p:cond delay="0"/>
+                            </p:stCondLst>
+                            <p:childTnLst>
+                              <p:par>
+                                <p:cTn id="9" presetID="1" presetClass="entr" presetSubtype="0" fill="hold" grpId="0" nodeType="clickEffect">
+                                  <p:stCondLst>
+                                    <p:cond delay="0"/>
+                                  </p:stCondLst>
+                                  <p:childTnLst>
+                                    <p:set>
+                                      <p:cBhvr>
+                                        <p:cTn id="10" dur="1" fill="hold">
+                                          <p:stCondLst>
+                                            <p:cond delay="0"/>
+                                          </p:stCondLst>
+                                        </p:cTn>
+                                        <p:tgtEl>
+                                          <p:spTgt spid="3">
+                                            <p:txEl>
+                                              <p:pRg st="1" end="1"/>
+                                            </p:txEl>
+                                          </p:spTgt>
+                                        </p:tgtEl>
+                                        <p:attrNameLst>
+                                          <p:attrName>style.visibility</p:attrName>
+                                        </p:attrNameLst>
+                                      </p:cBhvr>
+                                      <p:to>
+                                        <p:strVal val="visible"/>
+                                      </p:to>
+                                    </p:set>
+                                  </p:childTnLst>
+                                </p:cTn>
+                              </p:par>
+                            </p:childTnLst>
+                          </p:cTn>
+                        </p:par>
+                      </p:childTnLst>
+                    </p:cTn>
+                  </p:par>
+                  <p:par>
+                    <p:cTn id="11" fill="hold">
+                      <p:stCondLst>
+                        <p:cond delay="indefinite"/>
+                      </p:stCondLst>
+                      <p:childTnLst>
+                        <p:par>
+                          <p:cTn id="12" fill="hold">
+                            <p:stCondLst>
+                              <p:cond delay="0"/>
+                            </p:stCondLst>
+                            <p:childTnLst>
+                              <p:par>
+                                <p:cTn id="13" presetID="1" presetClass="entr" presetSubtype="0" fill="hold" grpId="0" nodeType="clickEffect">
+                                  <p:stCondLst>
+                                    <p:cond delay="0"/>
+                                  </p:stCondLst>
+                                  <p:childTnLst>
+                                    <p:set>
+                                      <p:cBhvr>
+                                        <p:cTn id="14" dur="1" fill="hold">
+                                          <p:stCondLst>
+                                            <p:cond delay="0"/>
+                                          </p:stCondLst>
+                                        </p:cTn>
+                                        <p:tgtEl>
+                                          <p:spTgt spid="3">
+                                            <p:txEl>
+                                              <p:pRg st="2" end="2"/>
+                                            </p:txEl>
+                                          </p:spTgt>
+                                        </p:tgtEl>
+                                        <p:attrNameLst>
+                                          <p:attrName>style.visibility</p:attrName>
+                                        </p:attrNameLst>
+                                      </p:cBhvr>
+                                      <p:to>
+                                        <p:strVal val="visible"/>
+                                      </p:to>
+                                    </p:set>
+                                  </p:childTnLst>
+                                </p:cTn>
+                              </p:par>
+                            </p:childTnLst>
+                          </p:cTn>
+                        </p:par>
+                      </p:childTnLst>
+                    </p:cTn>
+                  </p:par>
+                  <p:par>
+                    <p:cTn id="15" fill="hold">
+                      <p:stCondLst>
+                        <p:cond delay="indefinite"/>
+                      </p:stCondLst>
+                      <p:childTnLst>
+                        <p:par>
+                          <p:cTn id="16" fill="hold">
+                            <p:stCondLst>
+                              <p:cond delay="0"/>
+                            </p:stCondLst>
+                            <p:childTnLst>
+                              <p:par>
+                                <p:cTn id="17" presetID="1" presetClass="entr" presetSubtype="0" fill="hold" grpId="0" nodeType="clickEffect">
+                                  <p:stCondLst>
+                                    <p:cond delay="0"/>
+                                  </p:stCondLst>
+                                  <p:childTnLst>
+                                    <p:set>
+                                      <p:cBhvr>
+                                        <p:cTn id="18" dur="1" fill="hold">
+                                          <p:stCondLst>
+                                            <p:cond delay="0"/>
+                                          </p:stCondLst>
+                                        </p:cTn>
+                                        <p:tgtEl>
+                                          <p:spTgt spid="3">
+                                            <p:txEl>
+                                              <p:pRg st="3" end="3"/>
+                                            </p:txEl>
+                                          </p:spTgt>
+                                        </p:tgtEl>
+                                        <p:attrNameLst>
+                                          <p:attrName>style.visibility</p:attrName>
+                                        </p:attrNameLst>
+                                      </p:cBhvr>
+                                      <p:to>
+                                        <p:strVal val="visible"/>
+                                      </p:to>
+                                    </p:set>
+                                  </p:childTnLst>
+                                </p:cTn>
+                              </p:par>
+                            </p:childTnLst>
+                          </p:cTn>
+                        </p:par>
+                      </p:childTnLst>
+                    </p:cTn>
+                  </p:par>
+                  <p:par>
+                    <p:cTn id="19" fill="hold">
+                      <p:stCondLst>
+                        <p:cond delay="indefinite"/>
+                      </p:stCondLst>
+                      <p:childTnLst>
+                        <p:par>
+                          <p:cTn id="20" fill="hold">
+                            <p:stCondLst>
+                              <p:cond delay="0"/>
+                            </p:stCondLst>
+                            <p:childTnLst>
+                              <p:par>
+                                <p:cTn id="21" presetID="1" presetClass="entr" presetSubtype="0" fill="hold" grpId="0" nodeType="clickEffect">
+                                  <p:stCondLst>
+                                    <p:cond delay="0"/>
+                                  </p:stCondLst>
+                                  <p:childTnLst>
+                                    <p:set>
+                                      <p:cBhvr>
+                                        <p:cTn id="22" dur="1" fill="hold">
+                                          <p:stCondLst>
+                                            <p:cond delay="0"/>
+                                          </p:stCondLst>
+                                        </p:cTn>
+                                        <p:tgtEl>
+                                          <p:spTgt spid="3">
+                                            <p:txEl>
+                                              <p:pRg st="4" end="4"/>
+                                            </p:txEl>
+                                          </p:spTgt>
+                                        </p:tgtEl>
+                                        <p:attrNameLst>
+                                          <p:attrName>style.visibility</p:attrName>
+                                        </p:attrNameLst>
+                                      </p:cBhvr>
+                                      <p:to>
+                                        <p:strVal val="visible"/>
+                                      </p:to>
+                                    </p:set>
+                                  </p:childTnLst>
+                                </p:cTn>
+                              </p:par>
+                              <p:par>
+                                <p:cTn id="23" presetID="1" presetClass="entr" presetSubtype="0" fill="hold" grpId="0" nodeType="withEffect">
+                                  <p:stCondLst>
+                                    <p:cond delay="0"/>
+                                  </p:stCondLst>
+                                  <p:childTnLst>
+                                    <p:set>
+                                      <p:cBhvr>
+                                        <p:cTn id="24" dur="1" fill="hold">
+                                          <p:stCondLst>
+                                            <p:cond delay="0"/>
+                                          </p:stCondLst>
+                                        </p:cTn>
+                                        <p:tgtEl>
+                                          <p:spTgt spid="3">
+                                            <p:txEl>
+                                              <p:pRg st="5" end="5"/>
+                                            </p:txEl>
+                                          </p:spTgt>
+                                        </p:tgtEl>
+                                        <p:attrNameLst>
+                                          <p:attrName>style.visibility</p:attrName>
+                                        </p:attrNameLst>
+                                      </p:cBhvr>
+                                      <p:to>
+                                        <p:strVal val="visible"/>
+                                      </p:to>
+                                    </p:set>
+                                  </p:childTnLst>
+                                </p:cTn>
+                              </p:par>
+                              <p:par>
+                                <p:cTn id="25" presetID="1" presetClass="entr" presetSubtype="0" fill="hold" grpId="0" nodeType="withEffect">
+                                  <p:stCondLst>
+                                    <p:cond delay="0"/>
+                                  </p:stCondLst>
+                                  <p:childTnLst>
+                                    <p:set>
+                                      <p:cBhvr>
+                                        <p:cTn id="26" dur="1" fill="hold">
+                                          <p:stCondLst>
+                                            <p:cond delay="0"/>
+                                          </p:stCondLst>
+                                        </p:cTn>
+                                        <p:tgtEl>
+                                          <p:spTgt spid="3">
+                                            <p:txEl>
+                                              <p:pRg st="6" end="6"/>
+                                            </p:txEl>
+                                          </p:spTgt>
+                                        </p:tgtEl>
+                                        <p:attrNameLst>
+                                          <p:attrName>style.visibility</p:attrName>
+                                        </p:attrNameLst>
+                                      </p:cBhvr>
+                                      <p:to>
+                                        <p:strVal val="visible"/>
+                                      </p:to>
+                                    </p:set>
+                                  </p:childTnLst>
+                                </p:cTn>
+                              </p:par>
+                            </p:childTnLst>
+                          </p:cTn>
+                        </p:par>
+                      </p:childTnLst>
+                    </p:cTn>
+                  </p:par>
+                </p:childTnLst>
+              </p:cTn>
+              <p:prevCondLst>
+                <p:cond evt="onPrev" delay="0">
+                  <p:tgtEl>
+                    <p:sldTgt/>
+                  </p:tgtEl>
+                </p:cond>
+              </p:prevCondLst>
+              <p:nextCondLst>
+                <p:cond evt="onNext" delay="0">
+                  <p:tgtEl>
+                    <p:sldTgt/>
+                  </p:tgtEl>
+                </p:cond>
+              </p:nextCondLst>
+            </p:seq>
+          </p:childTnLst>
+        </p:cTn>
       </p:par>
     </p:tnLst>
+    <p:bldLst>
+      <p:bldP spid="3" grpId="0" uiExpand="1" build="p"/>
+    </p:bldLst>
   </p:timing>
 </p:sld>
 </file>
@@ -14689,19 +16820,44 @@
           <a:p>
             <a:r>
               <a:rPr lang="en-US" dirty="0" smtClean="0"/>
-              <a:t>Non-blocking peer-to-peer communication</a:t>
-            </a:r>
-          </a:p>
-          <a:p>
-            <a:r>
-              <a:rPr lang="en-US" dirty="0" smtClean="0"/>
               <a:t>Many more collectives (why?)</a:t>
             </a:r>
           </a:p>
           <a:p>
             <a:r>
+              <a:rPr lang="en-US" dirty="0"/>
+              <a:t>Non-blocking </a:t>
+            </a:r>
+            <a:r>
+              <a:rPr lang="en-US" dirty="0" smtClean="0"/>
+              <a:t>communication</a:t>
+            </a:r>
+          </a:p>
+          <a:p>
+            <a:r>
+              <a:rPr lang="en-US" dirty="0" smtClean="0"/>
+              <a:t>MPI-IO</a:t>
+            </a:r>
+            <a:endParaRPr lang="en-US" dirty="0"/>
+          </a:p>
+          <a:p>
+            <a:r>
               <a:rPr lang="en-US" dirty="0" smtClean="0"/>
               <a:t>One sided communication</a:t>
+            </a:r>
+          </a:p>
+          <a:p>
+            <a:r>
+              <a:rPr lang="en-US" dirty="0" smtClean="0"/>
+              <a:t>Hybrid </a:t>
+            </a:r>
+            <a:r>
+              <a:rPr lang="en-US" dirty="0" err="1" smtClean="0"/>
+              <a:t>OpenMP</a:t>
+            </a:r>
+            <a:r>
+              <a:rPr lang="en-US" dirty="0" smtClean="0"/>
+              <a:t>/MPI, MPI shared memory</a:t>
             </a:r>
           </a:p>
           <a:p>
@@ -14737,6 +16893,9 @@
                     <p:cTn id="3" fill="hold">
                       <p:stCondLst>
                         <p:cond delay="indefinite"/>
+                        <p:cond evt="onBegin" delay="0">
+                          <p:tn val="2"/>
+                        </p:cond>
                       </p:stCondLst>
                       <p:childTnLst>
                         <p:par>
@@ -14746,7 +16905,7 @@
                             </p:stCondLst>
                             <p:childTnLst>
                               <p:par>
-                                <p:cTn id="5" presetID="1" presetClass="entr" presetSubtype="0" fill="hold" grpId="0" nodeType="clickEffect">
+                                <p:cTn id="5" presetID="1" presetClass="entr" presetSubtype="0" fill="hold" grpId="0" nodeType="withEffect">
                                   <p:stCondLst>
                                     <p:cond delay="0"/>
                                   </p:stCondLst>
@@ -14978,6 +17137,104 @@
                       </p:childTnLst>
                     </p:cTn>
                   </p:par>
+                  <p:par>
+                    <p:cTn id="23" fill="hold">
+                      <p:stCondLst>
+                        <p:cond delay="indefinite"/>
+                      </p:stCondLst>
+                      <p:childTnLst>
+                        <p:par>
+                          <p:cTn id="24" fill="hold">
+                            <p:stCondLst>
+                              <p:cond delay="0"/>
+                            </p:stCondLst>
+                            <p:childTnLst>
+                              <p:par>
+                                <p:cTn id="25" presetID="1" presetClass="entr" presetSubtype="0" fill="hold" grpId="0" nodeType="clickEffect">
+                                  <p:stCondLst>
+                                    <p:cond delay="0"/>
+                                  </p:stCondLst>
+                                  <p:childTnLst>
+                                    <p:set>
+                                      <p:cBhvr>
+                                        <p:cTn id="26" dur="1" fill="hold">
+                                          <p:stCondLst>
+                                            <p:cond delay="0"/>
+                                          </p:stCondLst>
+                                        </p:cTn>
+                                        <p:tgtEl>
+                                          <p:spTgt spid="3">
+                                            <p:txEl>
+                                              <p:pRg st="5" end="5"/>
+                                            </p:txEl>
+                                          </p:spTgt>
+                                        </p:tgtEl>
+                                        <p:attrNameLst>
+                                          <p:attrName>style.visibility</p:attrName>
+                                        </p:attrNameLst>
+                                      </p:cBhvr>
+                                      <p:to>
+                                        <p:strVal val="visible"/>
+                                      </p:to>
+                                    </p:set>
+                                  </p:childTnLst>
+                                </p:cTn>
+                              </p:par>
+                            </p:childTnLst>
+                          </p:cTn>
+                        </p:par>
+                      </p:childTnLst>
+                    </p:cTn>
+                  </p:par>
+                  <p:par>
+                    <p:cTn id="27" fill="hold">
+                      <p:stCondLst>
+                        <p:cond delay="indefinite"/>
+                      </p:stCondLst>
+                      <p:childTnLst>
+                        <p:par>
+                          <p:cTn id="28" fill="hold">
+                            <p:stCondLst>
+                              <p:cond delay="0"/>
+                            </p:stCondLst>
+                            <p:childTnLst>
+                              <p:par>
+                                <p:cTn id="29" presetID="1" presetClass="entr" presetSubtype="0" fill="hold" grpId="0" nodeType="clickEffect">
+                                  <p:stCondLst>
+                                    <p:cond delay="0"/>
+                                  </p:stCondLst>
+                                  <p:childTnLst>
+                                    <p:set>
+                                      <p:cBhvr>
+                                        <p:cTn id="30" dur="1" fill="hold">
+                                          <p:stCondLst>
+                                            <p:cond delay="0"/>
+                                          </p:stCondLst>
+                                        </p:cTn>
+                                        <p:tgtEl>
+                                          <p:spTgt spid="3">
+                                            <p:txEl>
+                                              <p:pRg st="6" end="6"/>
+                                            </p:txEl>
+                                          </p:spTgt>
+                                        </p:tgtEl>
+                                        <p:attrNameLst>
+                                          <p:attrName>style.visibility</p:attrName>
+                                        </p:attrNameLst>
+                                      </p:cBhvr>
+                                      <p:to>
+                                        <p:strVal val="visible"/>
+                                      </p:to>
+                                    </p:set>
+                                  </p:childTnLst>
+                                </p:cTn>
+                              </p:par>
+                            </p:childTnLst>
+                          </p:cTn>
+                        </p:par>
+                      </p:childTnLst>
+                    </p:cTn>
+                  </p:par>
                 </p:childTnLst>
               </p:cTn>
               <p:prevCondLst>
@@ -15000,13 +17257,398 @@
       </p:par>
     </p:tnLst>
     <p:bldLst>
-      <p:bldP spid="3" grpId="0" build="p"/>
+      <p:bldP spid="3" grpId="0" uiExpand="1" build="p"/>
     </p:bldLst>
   </p:timing>
 </p:sld>
 </file>
 
 <file path=ppt/slides/slide27.xml><?xml version="1.0" encoding="utf-8"?>
+<p:sld xmlns:a="http://schemas.openxmlformats.org/drawingml/2006/main" xmlns:r="http://schemas.openxmlformats.org/officeDocument/2006/relationships" xmlns:p="http://schemas.openxmlformats.org/presentationml/2006/main">
+  <p:cSld>
+    <p:spTree>
+      <p:nvGrpSpPr>
+        <p:cNvPr id="1" name=""/>
+        <p:cNvGrpSpPr/>
+        <p:nvPr/>
+      </p:nvGrpSpPr>
+      <p:grpSpPr>
+        <a:xfrm>
+          <a:off x="0" y="0"/>
+          <a:ext cx="0" cy="0"/>
+          <a:chOff x="0" y="0"/>
+          <a:chExt cx="0" cy="0"/>
+        </a:xfrm>
+      </p:grpSpPr>
+      <p:sp>
+        <p:nvSpPr>
+          <p:cNvPr id="2" name="Title 1"/>
+          <p:cNvSpPr>
+            <a:spLocks noGrp="1"/>
+          </p:cNvSpPr>
+          <p:nvPr>
+            <p:ph type="title"/>
+          </p:nvPr>
+        </p:nvSpPr>
+        <p:spPr/>
+        <p:txBody>
+          <a:bodyPr/>
+          <a:lstStyle/>
+          <a:p>
+            <a:r>
+              <a:rPr lang="en-US" dirty="0" smtClean="0"/>
+              <a:t>Conclusions</a:t>
+            </a:r>
+            <a:endParaRPr lang="nl-BE" dirty="0"/>
+          </a:p>
+        </p:txBody>
+      </p:sp>
+      <p:sp>
+        <p:nvSpPr>
+          <p:cNvPr id="3" name="Content Placeholder 2"/>
+          <p:cNvSpPr>
+            <a:spLocks noGrp="1"/>
+          </p:cNvSpPr>
+          <p:nvPr>
+            <p:ph idx="1"/>
+          </p:nvPr>
+        </p:nvSpPr>
+        <p:spPr/>
+        <p:txBody>
+          <a:bodyPr/>
+          <a:lstStyle/>
+          <a:p>
+            <a:r>
+              <a:rPr lang="en-US" dirty="0"/>
+              <a:t>Nice, versatile programming model </a:t>
+            </a:r>
+            <a:endParaRPr lang="en-US" dirty="0" smtClean="0"/>
+          </a:p>
+          <a:p>
+            <a:r>
+              <a:rPr lang="en-US" dirty="0" smtClean="0"/>
+              <a:t>MPI has very extensive specification</a:t>
+            </a:r>
+          </a:p>
+          <a:p>
+            <a:pPr lvl="1"/>
+            <a:r>
+              <a:rPr lang="en-US" dirty="0" smtClean="0"/>
+              <a:t>Freely available as PDF</a:t>
+            </a:r>
+          </a:p>
+          <a:p>
+            <a:pPr lvl="1"/>
+            <a:r>
+              <a:rPr lang="en-US" dirty="0" smtClean="0"/>
+              <a:t>Easy to read, many examples</a:t>
+            </a:r>
+          </a:p>
+          <a:p>
+            <a:r>
+              <a:rPr lang="en-US" dirty="0" smtClean="0"/>
+              <a:t>Many nitty-gritty details</a:t>
+            </a:r>
+          </a:p>
+          <a:p>
+            <a:pPr lvl="1"/>
+            <a:r>
+              <a:rPr lang="en-US" dirty="0" smtClean="0"/>
+              <a:t>Important for efficiency</a:t>
+            </a:r>
+          </a:p>
+        </p:txBody>
+      </p:sp>
+    </p:spTree>
+    <p:extLst>
+      <p:ext uri="{BB962C8B-B14F-4D97-AF65-F5344CB8AC3E}">
+        <p14:creationId xmlns:p14="http://schemas.microsoft.com/office/powerpoint/2010/main" val="932625997"/>
+      </p:ext>
+    </p:extLst>
+  </p:cSld>
+  <p:clrMapOvr>
+    <a:masterClrMapping/>
+  </p:clrMapOvr>
+  <p:timing>
+    <p:tnLst>
+      <p:par>
+        <p:cTn id="1" dur="indefinite" restart="never" nodeType="tmRoot">
+          <p:childTnLst>
+            <p:seq concurrent="1" nextAc="seek">
+              <p:cTn id="2" dur="indefinite" nodeType="mainSeq">
+                <p:childTnLst>
+                  <p:par>
+                    <p:cTn id="3" fill="hold">
+                      <p:stCondLst>
+                        <p:cond delay="indefinite"/>
+                        <p:cond evt="onBegin" delay="0">
+                          <p:tn val="2"/>
+                        </p:cond>
+                      </p:stCondLst>
+                      <p:childTnLst>
+                        <p:par>
+                          <p:cTn id="4" fill="hold">
+                            <p:stCondLst>
+                              <p:cond delay="0"/>
+                            </p:stCondLst>
+                            <p:childTnLst>
+                              <p:par>
+                                <p:cTn id="5" presetID="1" presetClass="entr" presetSubtype="0" fill="hold" grpId="0" nodeType="withEffect">
+                                  <p:stCondLst>
+                                    <p:cond delay="0"/>
+                                  </p:stCondLst>
+                                  <p:childTnLst>
+                                    <p:set>
+                                      <p:cBhvr>
+                                        <p:cTn id="6" dur="1" fill="hold">
+                                          <p:stCondLst>
+                                            <p:cond delay="0"/>
+                                          </p:stCondLst>
+                                        </p:cTn>
+                                        <p:tgtEl>
+                                          <p:spTgt spid="3">
+                                            <p:txEl>
+                                              <p:pRg st="0" end="0"/>
+                                            </p:txEl>
+                                          </p:spTgt>
+                                        </p:tgtEl>
+                                        <p:attrNameLst>
+                                          <p:attrName>style.visibility</p:attrName>
+                                        </p:attrNameLst>
+                                      </p:cBhvr>
+                                      <p:to>
+                                        <p:strVal val="visible"/>
+                                      </p:to>
+                                    </p:set>
+                                  </p:childTnLst>
+                                </p:cTn>
+                              </p:par>
+                            </p:childTnLst>
+                          </p:cTn>
+                        </p:par>
+                      </p:childTnLst>
+                    </p:cTn>
+                  </p:par>
+                  <p:par>
+                    <p:cTn id="7" fill="hold">
+                      <p:stCondLst>
+                        <p:cond delay="indefinite"/>
+                      </p:stCondLst>
+                      <p:childTnLst>
+                        <p:par>
+                          <p:cTn id="8" fill="hold">
+                            <p:stCondLst>
+                              <p:cond delay="0"/>
+                            </p:stCondLst>
+                            <p:childTnLst>
+                              <p:par>
+                                <p:cTn id="9" presetID="1" presetClass="entr" presetSubtype="0" fill="hold" grpId="0" nodeType="clickEffect">
+                                  <p:stCondLst>
+                                    <p:cond delay="0"/>
+                                  </p:stCondLst>
+                                  <p:childTnLst>
+                                    <p:set>
+                                      <p:cBhvr>
+                                        <p:cTn id="10" dur="1" fill="hold">
+                                          <p:stCondLst>
+                                            <p:cond delay="0"/>
+                                          </p:stCondLst>
+                                        </p:cTn>
+                                        <p:tgtEl>
+                                          <p:spTgt spid="3">
+                                            <p:txEl>
+                                              <p:pRg st="1" end="1"/>
+                                            </p:txEl>
+                                          </p:spTgt>
+                                        </p:tgtEl>
+                                        <p:attrNameLst>
+                                          <p:attrName>style.visibility</p:attrName>
+                                        </p:attrNameLst>
+                                      </p:cBhvr>
+                                      <p:to>
+                                        <p:strVal val="visible"/>
+                                      </p:to>
+                                    </p:set>
+                                  </p:childTnLst>
+                                </p:cTn>
+                              </p:par>
+                              <p:par>
+                                <p:cTn id="11" presetID="1" presetClass="entr" presetSubtype="0" fill="hold" grpId="0" nodeType="withEffect">
+                                  <p:stCondLst>
+                                    <p:cond delay="0"/>
+                                  </p:stCondLst>
+                                  <p:childTnLst>
+                                    <p:set>
+                                      <p:cBhvr>
+                                        <p:cTn id="12" dur="1" fill="hold">
+                                          <p:stCondLst>
+                                            <p:cond delay="0"/>
+                                          </p:stCondLst>
+                                        </p:cTn>
+                                        <p:tgtEl>
+                                          <p:spTgt spid="3">
+                                            <p:txEl>
+                                              <p:pRg st="2" end="2"/>
+                                            </p:txEl>
+                                          </p:spTgt>
+                                        </p:tgtEl>
+                                        <p:attrNameLst>
+                                          <p:attrName>style.visibility</p:attrName>
+                                        </p:attrNameLst>
+                                      </p:cBhvr>
+                                      <p:to>
+                                        <p:strVal val="visible"/>
+                                      </p:to>
+                                    </p:set>
+                                  </p:childTnLst>
+                                </p:cTn>
+                              </p:par>
+                              <p:par>
+                                <p:cTn id="13" presetID="1" presetClass="entr" presetSubtype="0" fill="hold" grpId="0" nodeType="withEffect">
+                                  <p:stCondLst>
+                                    <p:cond delay="0"/>
+                                  </p:stCondLst>
+                                  <p:childTnLst>
+                                    <p:set>
+                                      <p:cBhvr>
+                                        <p:cTn id="14" dur="1" fill="hold">
+                                          <p:stCondLst>
+                                            <p:cond delay="0"/>
+                                          </p:stCondLst>
+                                        </p:cTn>
+                                        <p:tgtEl>
+                                          <p:spTgt spid="3">
+                                            <p:txEl>
+                                              <p:pRg st="3" end="3"/>
+                                            </p:txEl>
+                                          </p:spTgt>
+                                        </p:tgtEl>
+                                        <p:attrNameLst>
+                                          <p:attrName>style.visibility</p:attrName>
+                                        </p:attrNameLst>
+                                      </p:cBhvr>
+                                      <p:to>
+                                        <p:strVal val="visible"/>
+                                      </p:to>
+                                    </p:set>
+                                  </p:childTnLst>
+                                </p:cTn>
+                              </p:par>
+                            </p:childTnLst>
+                          </p:cTn>
+                        </p:par>
+                      </p:childTnLst>
+                    </p:cTn>
+                  </p:par>
+                  <p:par>
+                    <p:cTn id="15" fill="hold">
+                      <p:stCondLst>
+                        <p:cond delay="indefinite"/>
+                      </p:stCondLst>
+                      <p:childTnLst>
+                        <p:par>
+                          <p:cTn id="16" fill="hold">
+                            <p:stCondLst>
+                              <p:cond delay="0"/>
+                            </p:stCondLst>
+                            <p:childTnLst>
+                              <p:par>
+                                <p:cTn id="17" presetID="1" presetClass="entr" presetSubtype="0" fill="hold" grpId="0" nodeType="clickEffect">
+                                  <p:stCondLst>
+                                    <p:cond delay="0"/>
+                                  </p:stCondLst>
+                                  <p:childTnLst>
+                                    <p:set>
+                                      <p:cBhvr>
+                                        <p:cTn id="18" dur="1" fill="hold">
+                                          <p:stCondLst>
+                                            <p:cond delay="0"/>
+                                          </p:stCondLst>
+                                        </p:cTn>
+                                        <p:tgtEl>
+                                          <p:spTgt spid="3">
+                                            <p:txEl>
+                                              <p:pRg st="4" end="4"/>
+                                            </p:txEl>
+                                          </p:spTgt>
+                                        </p:tgtEl>
+                                        <p:attrNameLst>
+                                          <p:attrName>style.visibility</p:attrName>
+                                        </p:attrNameLst>
+                                      </p:cBhvr>
+                                      <p:to>
+                                        <p:strVal val="visible"/>
+                                      </p:to>
+                                    </p:set>
+                                  </p:childTnLst>
+                                </p:cTn>
+                              </p:par>
+                              <p:par>
+                                <p:cTn id="19" presetID="1" presetClass="entr" presetSubtype="0" fill="hold" grpId="0" nodeType="withEffect">
+                                  <p:stCondLst>
+                                    <p:cond delay="0"/>
+                                  </p:stCondLst>
+                                  <p:childTnLst>
+                                    <p:set>
+                                      <p:cBhvr>
+                                        <p:cTn id="20" dur="1" fill="hold">
+                                          <p:stCondLst>
+                                            <p:cond delay="0"/>
+                                          </p:stCondLst>
+                                        </p:cTn>
+                                        <p:tgtEl>
+                                          <p:spTgt spid="3">
+                                            <p:txEl>
+                                              <p:pRg st="5" end="5"/>
+                                            </p:txEl>
+                                          </p:spTgt>
+                                        </p:tgtEl>
+                                        <p:attrNameLst>
+                                          <p:attrName>style.visibility</p:attrName>
+                                        </p:attrNameLst>
+                                      </p:cBhvr>
+                                      <p:to>
+                                        <p:strVal val="visible"/>
+                                      </p:to>
+                                    </p:set>
+                                  </p:childTnLst>
+                                </p:cTn>
+                              </p:par>
+                            </p:childTnLst>
+                          </p:cTn>
+                        </p:par>
+                      </p:childTnLst>
+                    </p:cTn>
+                  </p:par>
+                </p:childTnLst>
+              </p:cTn>
+              <p:prevCondLst>
+                <p:cond evt="onPrev" delay="0">
+                  <p:tgtEl>
+                    <p:sldTgt/>
+                  </p:tgtEl>
+                </p:cond>
+              </p:prevCondLst>
+              <p:nextCondLst>
+                <p:cond evt="onNext" delay="0">
+                  <p:tgtEl>
+                    <p:sldTgt/>
+                  </p:tgtEl>
+                </p:cond>
+              </p:nextCondLst>
+            </p:seq>
+          </p:childTnLst>
+        </p:cTn>
+      </p:par>
+    </p:tnLst>
+    <p:bldLst>
+      <p:bldP spid="3" grpId="0" uiExpand="1" build="p"/>
+    </p:bldLst>
+  </p:timing>
+</p:sld>
+</file>
+
+<file path=ppt/slides/slide28.xml><?xml version="1.0" encoding="utf-8"?>
 <p:sld xmlns:a="http://schemas.openxmlformats.org/drawingml/2006/main" xmlns:r="http://schemas.openxmlformats.org/officeDocument/2006/relationships" xmlns:p="http://schemas.openxmlformats.org/presentationml/2006/main">
   <p:cSld>
     <p:spTree>
@@ -15469,6 +18111,13 @@
   <p:clrMapOvr>
     <a:masterClrMapping/>
   </p:clrMapOvr>
+  <p:timing>
+    <p:tnLst>
+      <p:par>
+        <p:cTn id="1" dur="indefinite" restart="never" nodeType="tmRoot"/>
+      </p:par>
+    </p:tnLst>
+  </p:timing>
 </p:sld>
 </file>
 
@@ -15525,7 +18174,7 @@
         <p:spPr/>
         <p:txBody>
           <a:bodyPr>
-            <a:normAutofit fontScale="92500"/>
+            <a:normAutofit fontScale="92500" lnSpcReduction="10000"/>
           </a:bodyPr>
           <a:lstStyle/>
           <a:p>
@@ -15538,14 +18187,29 @@
             <a:pPr lvl="1"/>
             <a:r>
               <a:rPr lang="en-US" dirty="0" smtClean="0"/>
-              <a:t>standardized, currently MPI-3, in practice MPI-2.2</a:t>
+              <a:t>standardized, currently </a:t>
+            </a:r>
+            <a:r>
+              <a:rPr lang="en-US" dirty="0" smtClean="0"/>
+              <a:t>MPI-3.1,</a:t>
+            </a:r>
+            <a:br>
+              <a:rPr lang="en-US" dirty="0" smtClean="0"/>
+            </a:br>
+            <a:r>
+              <a:rPr lang="en-US" dirty="0" smtClean="0"/>
+              <a:t>implemented: </a:t>
+            </a:r>
+            <a:r>
+              <a:rPr lang="en-US" dirty="0" smtClean="0"/>
+              <a:t>most of MPI-3</a:t>
             </a:r>
           </a:p>
           <a:p>
             <a:pPr lvl="1"/>
             <a:r>
               <a:rPr lang="en-US" dirty="0" smtClean="0"/>
-              <a:t>available in C and Fortran</a:t>
+              <a:t>available for C and Fortran</a:t>
             </a:r>
           </a:p>
           <a:p>
@@ -15625,6 +18289,9 @@
                     <p:cTn id="3" fill="hold">
                       <p:stCondLst>
                         <p:cond delay="indefinite"/>
+                        <p:cond evt="onBegin" delay="0">
+                          <p:tn val="2"/>
+                        </p:cond>
                       </p:stCondLst>
                       <p:childTnLst>
                         <p:par>
@@ -15634,7 +18301,7 @@
                             </p:stCondLst>
                             <p:childTnLst>
                               <p:par>
-                                <p:cTn id="5" presetID="1" presetClass="entr" presetSubtype="0" fill="hold" grpId="0" nodeType="clickEffect">
+                                <p:cTn id="5" presetID="1" presetClass="entr" presetSubtype="0" fill="hold" grpId="0" nodeType="withEffect">
                                   <p:stCondLst>
                                     <p:cond delay="0"/>
                                   </p:stCondLst>
@@ -16043,7 +18710,7 @@
       </p:par>
     </p:tnLst>
     <p:bldLst>
-      <p:bldP spid="3" grpId="0" build="p" bldLvl="2"/>
+      <p:bldP spid="3" grpId="0" uiExpand="1" build="p" bldLvl="2"/>
     </p:bldLst>
   </p:timing>
 </p:sld>
@@ -16311,6 +18978,9 @@
                     <p:cTn id="3" fill="hold">
                       <p:stCondLst>
                         <p:cond delay="indefinite"/>
+                        <p:cond evt="onBegin" delay="0">
+                          <p:tn val="2"/>
+                        </p:cond>
                       </p:stCondLst>
                       <p:childTnLst>
                         <p:par>
@@ -16320,7 +18990,7 @@
                             </p:stCondLst>
                             <p:childTnLst>
                               <p:par>
-                                <p:cTn id="5" presetID="1" presetClass="entr" presetSubtype="0" fill="hold" grpId="0" nodeType="clickEffect">
+                                <p:cTn id="5" presetID="1" presetClass="entr" presetSubtype="0" fill="hold" grpId="0" nodeType="withEffect">
                                   <p:stCondLst>
                                     <p:cond delay="0"/>
                                   </p:stCondLst>
@@ -16764,6 +19434,51 @@
                       </p:childTnLst>
                     </p:cTn>
                   </p:par>
+                  <p:par>
+                    <p:cTn id="35" fill="hold">
+                      <p:stCondLst>
+                        <p:cond delay="indefinite"/>
+                      </p:stCondLst>
+                      <p:childTnLst>
+                        <p:par>
+                          <p:cTn id="36" fill="hold">
+                            <p:stCondLst>
+                              <p:cond delay="0"/>
+                            </p:stCondLst>
+                            <p:childTnLst>
+                              <p:par>
+                                <p:cTn id="37" presetID="1" presetClass="entr" presetSubtype="0" fill="hold" grpId="0" nodeType="clickEffect">
+                                  <p:stCondLst>
+                                    <p:cond delay="0"/>
+                                  </p:stCondLst>
+                                  <p:childTnLst>
+                                    <p:set>
+                                      <p:cBhvr>
+                                        <p:cTn id="38" dur="1" fill="hold">
+                                          <p:stCondLst>
+                                            <p:cond delay="0"/>
+                                          </p:stCondLst>
+                                        </p:cTn>
+                                        <p:tgtEl>
+                                          <p:spTgt spid="4"/>
+                                        </p:tgtEl>
+                                        <p:attrNameLst>
+                                          <p:attrName>style.visibility</p:attrName>
+                                        </p:attrNameLst>
+                                      </p:cBhvr>
+                                      <p:to>
+                                        <p:strVal val="visible"/>
+                                      </p:to>
+                                    </p:set>
+                                  </p:childTnLst>
+                                </p:cTn>
+                              </p:par>
+                            </p:childTnLst>
+                          </p:cTn>
+                        </p:par>
+                      </p:childTnLst>
+                    </p:cTn>
+                  </p:par>
                 </p:childTnLst>
               </p:cTn>
               <p:prevCondLst>
@@ -16786,7 +19501,8 @@
       </p:par>
     </p:tnLst>
     <p:bldLst>
-      <p:bldP spid="3" grpId="0" build="p"/>
+      <p:bldP spid="3" grpId="0" uiExpand="1" build="p"/>
+      <p:bldP spid="4" grpId="0" animBg="1"/>
     </p:bldLst>
   </p:timing>
 </p:sld>
@@ -18030,7 +20746,7 @@
               <a:rPr lang="en-US" dirty="0" smtClean="0">
                 <a:cs typeface="Courier New" panose="02070309020205020404" pitchFamily="49" charset="0"/>
               </a:rPr>
-              <a:t>Rank used as "address" within communicator</a:t>
+              <a:t>Rank used as "address" within communicator, and to differentiate "roles" of processes</a:t>
             </a:r>
             <a:endParaRPr lang="nl-BE" dirty="0"/>
           </a:p>
@@ -18058,6 +20774,9 @@
                     <p:cTn id="3" fill="hold">
                       <p:stCondLst>
                         <p:cond delay="indefinite"/>
+                        <p:cond evt="onBegin" delay="0">
+                          <p:tn val="2"/>
+                        </p:cond>
                       </p:stCondLst>
                       <p:childTnLst>
                         <p:par>
@@ -18067,7 +20786,7 @@
                             </p:stCondLst>
                             <p:childTnLst>
                               <p:par>
-                                <p:cTn id="5" presetID="1" presetClass="entr" presetSubtype="0" fill="hold" grpId="0" nodeType="clickEffect">
+                                <p:cTn id="5" presetID="1" presetClass="entr" presetSubtype="0" fill="hold" grpId="0" nodeType="withEffect">
                                   <p:stCondLst>
                                     <p:cond delay="0"/>
                                   </p:stCondLst>
@@ -18321,7 +21040,7 @@
       </p:par>
     </p:tnLst>
     <p:bldLst>
-      <p:bldP spid="3" grpId="0" build="p"/>
+      <p:bldP spid="3" grpId="0" uiExpand="1" build="p"/>
     </p:bldLst>
   </p:timing>
 </p:sld>
@@ -18609,7 +21328,7 @@
         </p:nvSpPr>
         <p:spPr>
           <a:xfrm>
-            <a:off x="6372200" y="5085184"/>
+            <a:off x="6486946" y="4725144"/>
             <a:ext cx="2189510" cy="1200329"/>
           </a:xfrm>
           <a:prstGeom prst="rect">
@@ -18723,6 +21442,41 @@
               <a:t>"shared nothing"</a:t>
             </a:r>
             <a:endParaRPr lang="nl-BE" sz="2400" i="1" dirty="0"/>
+          </a:p>
+        </p:txBody>
+      </p:sp>
+      <p:sp>
+        <p:nvSpPr>
+          <p:cNvPr id="3" name="TextBox 2"/>
+          <p:cNvSpPr txBox="1"/>
+          <p:nvPr/>
+        </p:nvSpPr>
+        <p:spPr>
+          <a:xfrm>
+            <a:off x="179512" y="5991671"/>
+            <a:ext cx="5966120" cy="461665"/>
+          </a:xfrm>
+          <a:prstGeom prst="rect">
+            <a:avLst/>
+          </a:prstGeom>
+          <a:noFill/>
+          <a:ln>
+            <a:solidFill>
+              <a:schemeClr val="tx1"/>
+            </a:solidFill>
+          </a:ln>
+        </p:spPr>
+        <p:txBody>
+          <a:bodyPr wrap="none" rtlCol="0">
+            <a:spAutoFit/>
+          </a:bodyPr>
+          <a:lstStyle/>
+          <a:p>
+            <a:r>
+              <a:rPr lang="en-US" sz="2400" dirty="0" smtClean="0"/>
+              <a:t>Processes can run on different compute nodes</a:t>
+            </a:r>
+            <a:endParaRPr lang="nl-BE" sz="2400" dirty="0"/>
           </a:p>
         </p:txBody>
       </p:sp>
@@ -18783,6 +21537,33 @@
                                   </p:childTnLst>
                                 </p:cTn>
                               </p:par>
+                              <p:par>
+                                <p:cTn id="7" presetID="1" presetClass="entr" presetSubtype="0" fill="hold" grpId="0" nodeType="withEffect">
+                                  <p:stCondLst>
+                                    <p:cond delay="0"/>
+                                  </p:stCondLst>
+                                  <p:childTnLst>
+                                    <p:set>
+                                      <p:cBhvr>
+                                        <p:cTn id="8" dur="1" fill="hold">
+                                          <p:stCondLst>
+                                            <p:cond delay="0"/>
+                                          </p:stCondLst>
+                                        </p:cTn>
+                                        <p:tgtEl>
+                                          <p:spTgt spid="3"/>
+                                        </p:tgtEl>
+                                        <p:attrNameLst>
+                                          <p:attrName>style.visibility</p:attrName>
+                                        </p:attrNameLst>
+                                      </p:cBhvr>
+                                      <p:to>
+                                        <p:strVal val="visible"/>
+                                      </p:to>
+                                    </p:set>
+                                  </p:childTnLst>
+                                </p:cTn>
+                              </p:par>
                             </p:childTnLst>
                           </p:cTn>
                         </p:par>
@@ -18790,26 +21571,26 @@
                     </p:cTn>
                   </p:par>
                   <p:par>
-                    <p:cTn id="7" fill="hold">
+                    <p:cTn id="9" fill="hold">
                       <p:stCondLst>
                         <p:cond delay="indefinite"/>
                       </p:stCondLst>
                       <p:childTnLst>
                         <p:par>
-                          <p:cTn id="8" fill="hold">
+                          <p:cTn id="10" fill="hold">
                             <p:stCondLst>
                               <p:cond delay="0"/>
                             </p:stCondLst>
                             <p:childTnLst>
                               <p:par>
-                                <p:cTn id="9" presetID="1" presetClass="entr" presetSubtype="0" fill="hold" grpId="0" nodeType="clickEffect">
+                                <p:cTn id="11" presetID="1" presetClass="entr" presetSubtype="0" fill="hold" grpId="0" nodeType="clickEffect">
                                   <p:stCondLst>
                                     <p:cond delay="0"/>
                                   </p:stCondLst>
                                   <p:childTnLst>
                                     <p:set>
                                       <p:cBhvr>
-                                        <p:cTn id="10" dur="1" fill="hold">
+                                        <p:cTn id="12" dur="1" fill="hold">
                                           <p:stCondLst>
                                             <p:cond delay="0"/>
                                           </p:stCondLst>
@@ -18858,6 +21639,7 @@
     <p:bldLst>
       <p:bldP spid="5" grpId="0" animBg="1"/>
       <p:bldP spid="6" grpId="0" animBg="1"/>
+      <p:bldP spid="3" grpId="0" animBg="1"/>
     </p:bldLst>
   </p:timing>
 </p:sld>
@@ -18926,40 +21708,14 @@
           <a:p>
             <a:r>
               <a:rPr lang="en-US" dirty="0" smtClean="0"/>
-              <a:t>Processes have own data, shared nothing</a:t>
-            </a:r>
-          </a:p>
-          <a:p>
-            <a:r>
-              <a:rPr lang="en-US" dirty="0" smtClean="0"/>
-              <a:t>Processes communicate to exchange information, </a:t>
-            </a:r>
-            <a:r>
-              <a:rPr lang="en-US" dirty="0" smtClean="0"/>
-              <a:t>data, state</a:t>
-            </a:r>
-            <a:endParaRPr lang="en-US" dirty="0" smtClean="0"/>
-          </a:p>
-          <a:p>
-            <a:r>
-              <a:rPr lang="en-US" dirty="0" smtClean="0"/>
-              <a:t>Processes can run</a:t>
-            </a:r>
-          </a:p>
-          <a:p>
-            <a:pPr lvl="1"/>
-            <a:r>
-              <a:rPr lang="en-US" dirty="0" smtClean="0"/>
-              <a:t>on same host</a:t>
-            </a:r>
-          </a:p>
-          <a:p>
-            <a:pPr lvl="1"/>
-            <a:r>
-              <a:rPr lang="en-US" dirty="0" smtClean="0"/>
-              <a:t>on multiple hosts</a:t>
-            </a:r>
-            <a:endParaRPr lang="nl-BE" dirty="0"/>
+              <a:t>Processes have own data, share nothing</a:t>
+            </a:r>
+          </a:p>
+          <a:p>
+            <a:r>
+              <a:rPr lang="en-US" dirty="0" smtClean="0"/>
+              <a:t>Processes communicate to exchange information, data, state</a:t>
+            </a:r>
           </a:p>
         </p:txBody>
       </p:sp>
@@ -18985,6 +21741,9 @@
                     <p:cTn id="3" fill="hold">
                       <p:stCondLst>
                         <p:cond delay="indefinite"/>
+                        <p:cond evt="onBegin" delay="0">
+                          <p:tn val="2"/>
+                        </p:cond>
                       </p:stCondLst>
                       <p:childTnLst>
                         <p:par>
@@ -18994,7 +21753,7 @@
                             </p:stCondLst>
                             <p:childTnLst>
                               <p:par>
-                                <p:cTn id="5" presetID="1" presetClass="entr" presetSubtype="0" fill="hold" grpId="0" nodeType="clickEffect">
+                                <p:cTn id="5" presetID="1" presetClass="entr" presetSubtype="0" fill="hold" grpId="0" nodeType="withEffect">
                                   <p:stCondLst>
                                     <p:cond delay="0"/>
                                   </p:stCondLst>
@@ -19128,117 +21887,6 @@
                       </p:childTnLst>
                     </p:cTn>
                   </p:par>
-                  <p:par>
-                    <p:cTn id="15" fill="hold">
-                      <p:stCondLst>
-                        <p:cond delay="indefinite"/>
-                      </p:stCondLst>
-                      <p:childTnLst>
-                        <p:par>
-                          <p:cTn id="16" fill="hold">
-                            <p:stCondLst>
-                              <p:cond delay="0"/>
-                            </p:stCondLst>
-                            <p:childTnLst>
-                              <p:par>
-                                <p:cTn id="17" presetID="1" presetClass="entr" presetSubtype="0" fill="hold" grpId="0" nodeType="clickEffect">
-                                  <p:stCondLst>
-                                    <p:cond delay="0"/>
-                                  </p:stCondLst>
-                                  <p:childTnLst>
-                                    <p:set>
-                                      <p:cBhvr>
-                                        <p:cTn id="18" dur="1" fill="hold">
-                                          <p:stCondLst>
-                                            <p:cond delay="0"/>
-                                          </p:stCondLst>
-                                        </p:cTn>
-                                        <p:tgtEl>
-                                          <p:spTgt spid="4">
-                                            <p:txEl>
-                                              <p:pRg st="3" end="3"/>
-                                            </p:txEl>
-                                          </p:spTgt>
-                                        </p:tgtEl>
-                                        <p:attrNameLst>
-                                          <p:attrName>style.visibility</p:attrName>
-                                        </p:attrNameLst>
-                                      </p:cBhvr>
-                                      <p:to>
-                                        <p:strVal val="visible"/>
-                                      </p:to>
-                                    </p:set>
-                                  </p:childTnLst>
-                                </p:cTn>
-                              </p:par>
-                              <p:par>
-                                <p:cTn id="19" presetID="1" presetClass="entr" presetSubtype="0" fill="hold" grpId="0" nodeType="withEffect">
-                                  <p:stCondLst>
-                                    <p:cond delay="0"/>
-                                  </p:stCondLst>
-                                  <p:childTnLst>
-                                    <p:set>
-                                      <p:cBhvr>
-                                        <p:cTn id="20" dur="1" fill="hold">
-                                          <p:stCondLst>
-                                            <p:cond delay="0"/>
-                                          </p:stCondLst>
-                                        </p:cTn>
-                                        <p:tgtEl>
-                                          <p:spTgt spid="4">
-                                            <p:txEl>
-                                              <p:pRg st="4" end="4"/>
-                                            </p:txEl>
-                                          </p:spTgt>
-                                        </p:tgtEl>
-                                        <p:attrNameLst>
-                                          <p:attrName>style.visibility</p:attrName>
-                                        </p:attrNameLst>
-                                      </p:cBhvr>
-                                      <p:to>
-                                        <p:strVal val="visible"/>
-                                      </p:to>
-                                    </p:set>
-                                  </p:childTnLst>
-                                </p:cTn>
-                              </p:par>
-                              <p:par>
-                                <p:cTn id="21" presetID="1" presetClass="entr" presetSubtype="0" fill="hold" grpId="0" nodeType="withEffect">
-                                  <p:stCondLst>
-                                    <p:cond delay="0"/>
-                                  </p:stCondLst>
-                                  <p:childTnLst>
-                                    <p:set>
-                                      <p:cBhvr>
-                                        <p:cTn id="22" dur="1" fill="hold">
-                                          <p:stCondLst>
-                                            <p:cond delay="0"/>
-                                          </p:stCondLst>
-                                        </p:cTn>
-                                        <p:tgtEl>
-                                          <p:spTgt spid="4">
-                                            <p:txEl>
-                                              <p:pRg st="5" end="5"/>
-                                            </p:txEl>
-                                          </p:spTgt>
-                                        </p:tgtEl>
-                                        <p:attrNameLst>
-                                          <p:attrName>style.visibility</p:attrName>
-                                        </p:attrNameLst>
-                                      </p:cBhvr>
-                                      <p:to>
-                                        <p:strVal val="visible"/>
-                                      </p:to>
-                                    </p:set>
-                                  </p:childTnLst>
-                                </p:cTn>
-                              </p:par>
-                            </p:childTnLst>
-                          </p:cTn>
-                        </p:par>
-                      </p:childTnLst>
-                    </p:cTn>
-                  </p:par>
                 </p:childTnLst>
               </p:cTn>
               <p:prevCondLst>
@@ -19261,7 +21909,7 @@
       </p:par>
     </p:tnLst>
     <p:bldLst>
-      <p:bldP spid="4" grpId="0" build="p"/>
+      <p:bldP spid="4" grpId="0" uiExpand="1" build="p"/>
     </p:bldLst>
   </p:timing>
 </p:sld>

</xml_diff>

<commit_message>
Added MPI pitfalls slide
</commit_message>
<xml_diff>
--- a/Mpi/mpi.pptx
+++ b/Mpi/mpi.pptx
@@ -31,8 +31,9 @@
     <p:sldId id="279" r:id="rId25"/>
     <p:sldId id="280" r:id="rId26"/>
     <p:sldId id="281" r:id="rId27"/>
-    <p:sldId id="284" r:id="rId28"/>
-    <p:sldId id="271" r:id="rId29"/>
+    <p:sldId id="285" r:id="rId28"/>
+    <p:sldId id="284" r:id="rId29"/>
+    <p:sldId id="271" r:id="rId30"/>
   </p:sldIdLst>
   <p:sldSz cx="9144000" cy="6858000" type="screen4x3"/>
   <p:notesSz cx="6858000" cy="9144000"/>
@@ -3146,7 +3147,11 @@
             </a:br>
             <a:r>
               <a:rPr lang="en-US" dirty="0" smtClean="0"/>
-              <a:t>using MPI</a:t>
+              <a:t>using </a:t>
+            </a:r>
+            <a:r>
+              <a:rPr lang="en-US" dirty="0" smtClean="0"/>
+              <a:t>MPI: a gentle introduction</a:t>
             </a:r>
             <a:endParaRPr lang="nl-BE" dirty="0"/>
           </a:p>
@@ -16836,7 +16841,7 @@
           <a:p>
             <a:r>
               <a:rPr lang="en-US" dirty="0" smtClean="0"/>
-              <a:t>MPI-IO</a:t>
+              <a:t>MPI I/O</a:t>
             </a:r>
             <a:endParaRPr lang="en-US" dirty="0"/>
           </a:p>
@@ -17297,6 +17302,509 @@
           <a:p>
             <a:r>
               <a:rPr lang="en-US" dirty="0" smtClean="0"/>
+              <a:t>Pitfalls</a:t>
+            </a:r>
+            <a:endParaRPr lang="nl-BE" dirty="0"/>
+          </a:p>
+        </p:txBody>
+      </p:sp>
+      <p:sp>
+        <p:nvSpPr>
+          <p:cNvPr id="3" name="Content Placeholder 2"/>
+          <p:cNvSpPr>
+            <a:spLocks noGrp="1"/>
+          </p:cNvSpPr>
+          <p:nvPr>
+            <p:ph idx="1"/>
+          </p:nvPr>
+        </p:nvSpPr>
+        <p:spPr/>
+        <p:txBody>
+          <a:bodyPr>
+            <a:normAutofit lnSpcReduction="10000"/>
+          </a:bodyPr>
+          <a:lstStyle/>
+          <a:p>
+            <a:r>
+              <a:rPr lang="en-US" dirty="0" smtClean="0"/>
+              <a:t>Deadlocks</a:t>
+            </a:r>
+          </a:p>
+          <a:p>
+            <a:pPr lvl="1"/>
+            <a:r>
+              <a:rPr lang="en-US" dirty="0" smtClean="0"/>
+              <a:t>Blocking communication</a:t>
+            </a:r>
+          </a:p>
+          <a:p>
+            <a:r>
+              <a:rPr lang="en-US" dirty="0" smtClean="0"/>
+              <a:t>Race conditions</a:t>
+            </a:r>
+          </a:p>
+          <a:p>
+            <a:pPr lvl="1"/>
+            <a:r>
+              <a:rPr lang="en-US" dirty="0" smtClean="0"/>
+              <a:t>Non-blocking communication</a:t>
+            </a:r>
+          </a:p>
+          <a:p>
+            <a:pPr lvl="1"/>
+            <a:r>
+              <a:rPr lang="en-US" dirty="0" smtClean="0"/>
+              <a:t>One-sided communication</a:t>
+            </a:r>
+          </a:p>
+          <a:p>
+            <a:pPr lvl="1"/>
+            <a:r>
+              <a:rPr lang="en-US" dirty="0" smtClean="0"/>
+              <a:t>MPI shared memory</a:t>
+            </a:r>
+          </a:p>
+          <a:p>
+            <a:r>
+              <a:rPr lang="en-US" dirty="0" smtClean="0"/>
+              <a:t>Bad performance</a:t>
+            </a:r>
+          </a:p>
+          <a:p>
+            <a:pPr lvl="1"/>
+            <a:r>
+              <a:rPr lang="en-US" dirty="0" smtClean="0"/>
+              <a:t>Load imbalance</a:t>
+            </a:r>
+          </a:p>
+          <a:p>
+            <a:pPr lvl="1"/>
+            <a:r>
+              <a:rPr lang="en-US" dirty="0" smtClean="0"/>
+              <a:t>Communication overhead</a:t>
+            </a:r>
+          </a:p>
+          <a:p>
+            <a:endParaRPr lang="nl-BE" dirty="0"/>
+          </a:p>
+        </p:txBody>
+      </p:sp>
+    </p:spTree>
+    <p:extLst>
+      <p:ext uri="{BB962C8B-B14F-4D97-AF65-F5344CB8AC3E}">
+        <p14:creationId xmlns:p14="http://schemas.microsoft.com/office/powerpoint/2010/main" val="506396616"/>
+      </p:ext>
+    </p:extLst>
+  </p:cSld>
+  <p:clrMapOvr>
+    <a:masterClrMapping/>
+  </p:clrMapOvr>
+  <p:timing>
+    <p:tnLst>
+      <p:par>
+        <p:cTn id="1" dur="indefinite" restart="never" nodeType="tmRoot">
+          <p:childTnLst>
+            <p:seq concurrent="1" nextAc="seek">
+              <p:cTn id="2" dur="indefinite" nodeType="mainSeq">
+                <p:childTnLst>
+                  <p:par>
+                    <p:cTn id="3" fill="hold">
+                      <p:stCondLst>
+                        <p:cond delay="indefinite"/>
+                        <p:cond evt="onBegin" delay="0">
+                          <p:tn val="2"/>
+                        </p:cond>
+                      </p:stCondLst>
+                      <p:childTnLst>
+                        <p:par>
+                          <p:cTn id="4" fill="hold">
+                            <p:stCondLst>
+                              <p:cond delay="0"/>
+                            </p:stCondLst>
+                            <p:childTnLst>
+                              <p:par>
+                                <p:cTn id="5" presetID="1" presetClass="entr" presetSubtype="0" fill="hold" grpId="0" nodeType="withEffect">
+                                  <p:stCondLst>
+                                    <p:cond delay="0"/>
+                                  </p:stCondLst>
+                                  <p:childTnLst>
+                                    <p:set>
+                                      <p:cBhvr>
+                                        <p:cTn id="6" dur="1" fill="hold">
+                                          <p:stCondLst>
+                                            <p:cond delay="0"/>
+                                          </p:stCondLst>
+                                        </p:cTn>
+                                        <p:tgtEl>
+                                          <p:spTgt spid="3">
+                                            <p:txEl>
+                                              <p:pRg st="0" end="0"/>
+                                            </p:txEl>
+                                          </p:spTgt>
+                                        </p:tgtEl>
+                                        <p:attrNameLst>
+                                          <p:attrName>style.visibility</p:attrName>
+                                        </p:attrNameLst>
+                                      </p:cBhvr>
+                                      <p:to>
+                                        <p:strVal val="visible"/>
+                                      </p:to>
+                                    </p:set>
+                                  </p:childTnLst>
+                                </p:cTn>
+                              </p:par>
+                              <p:par>
+                                <p:cTn id="7" presetID="1" presetClass="entr" presetSubtype="0" fill="hold" grpId="0" nodeType="withEffect">
+                                  <p:stCondLst>
+                                    <p:cond delay="0"/>
+                                  </p:stCondLst>
+                                  <p:childTnLst>
+                                    <p:set>
+                                      <p:cBhvr>
+                                        <p:cTn id="8" dur="1" fill="hold">
+                                          <p:stCondLst>
+                                            <p:cond delay="0"/>
+                                          </p:stCondLst>
+                                        </p:cTn>
+                                        <p:tgtEl>
+                                          <p:spTgt spid="3">
+                                            <p:txEl>
+                                              <p:pRg st="1" end="1"/>
+                                            </p:txEl>
+                                          </p:spTgt>
+                                        </p:tgtEl>
+                                        <p:attrNameLst>
+                                          <p:attrName>style.visibility</p:attrName>
+                                        </p:attrNameLst>
+                                      </p:cBhvr>
+                                      <p:to>
+                                        <p:strVal val="visible"/>
+                                      </p:to>
+                                    </p:set>
+                                  </p:childTnLst>
+                                </p:cTn>
+                              </p:par>
+                            </p:childTnLst>
+                          </p:cTn>
+                        </p:par>
+                      </p:childTnLst>
+                    </p:cTn>
+                  </p:par>
+                  <p:par>
+                    <p:cTn id="9" fill="hold">
+                      <p:stCondLst>
+                        <p:cond delay="indefinite"/>
+                      </p:stCondLst>
+                      <p:childTnLst>
+                        <p:par>
+                          <p:cTn id="10" fill="hold">
+                            <p:stCondLst>
+                              <p:cond delay="0"/>
+                            </p:stCondLst>
+                            <p:childTnLst>
+                              <p:par>
+                                <p:cTn id="11" presetID="1" presetClass="entr" presetSubtype="0" fill="hold" grpId="0" nodeType="clickEffect">
+                                  <p:stCondLst>
+                                    <p:cond delay="0"/>
+                                  </p:stCondLst>
+                                  <p:childTnLst>
+                                    <p:set>
+                                      <p:cBhvr>
+                                        <p:cTn id="12" dur="1" fill="hold">
+                                          <p:stCondLst>
+                                            <p:cond delay="0"/>
+                                          </p:stCondLst>
+                                        </p:cTn>
+                                        <p:tgtEl>
+                                          <p:spTgt spid="3">
+                                            <p:txEl>
+                                              <p:pRg st="2" end="2"/>
+                                            </p:txEl>
+                                          </p:spTgt>
+                                        </p:tgtEl>
+                                        <p:attrNameLst>
+                                          <p:attrName>style.visibility</p:attrName>
+                                        </p:attrNameLst>
+                                      </p:cBhvr>
+                                      <p:to>
+                                        <p:strVal val="visible"/>
+                                      </p:to>
+                                    </p:set>
+                                  </p:childTnLst>
+                                </p:cTn>
+                              </p:par>
+                              <p:par>
+                                <p:cTn id="13" presetID="1" presetClass="entr" presetSubtype="0" fill="hold" grpId="0" nodeType="withEffect">
+                                  <p:stCondLst>
+                                    <p:cond delay="0"/>
+                                  </p:stCondLst>
+                                  <p:childTnLst>
+                                    <p:set>
+                                      <p:cBhvr>
+                                        <p:cTn id="14" dur="1" fill="hold">
+                                          <p:stCondLst>
+                                            <p:cond delay="0"/>
+                                          </p:stCondLst>
+                                        </p:cTn>
+                                        <p:tgtEl>
+                                          <p:spTgt spid="3">
+                                            <p:txEl>
+                                              <p:pRg st="3" end="3"/>
+                                            </p:txEl>
+                                          </p:spTgt>
+                                        </p:tgtEl>
+                                        <p:attrNameLst>
+                                          <p:attrName>style.visibility</p:attrName>
+                                        </p:attrNameLst>
+                                      </p:cBhvr>
+                                      <p:to>
+                                        <p:strVal val="visible"/>
+                                      </p:to>
+                                    </p:set>
+                                  </p:childTnLst>
+                                </p:cTn>
+                              </p:par>
+                              <p:par>
+                                <p:cTn id="15" presetID="1" presetClass="entr" presetSubtype="0" fill="hold" grpId="0" nodeType="withEffect">
+                                  <p:stCondLst>
+                                    <p:cond delay="0"/>
+                                  </p:stCondLst>
+                                  <p:childTnLst>
+                                    <p:set>
+                                      <p:cBhvr>
+                                        <p:cTn id="16" dur="1" fill="hold">
+                                          <p:stCondLst>
+                                            <p:cond delay="0"/>
+                                          </p:stCondLst>
+                                        </p:cTn>
+                                        <p:tgtEl>
+                                          <p:spTgt spid="3">
+                                            <p:txEl>
+                                              <p:pRg st="4" end="4"/>
+                                            </p:txEl>
+                                          </p:spTgt>
+                                        </p:tgtEl>
+                                        <p:attrNameLst>
+                                          <p:attrName>style.visibility</p:attrName>
+                                        </p:attrNameLst>
+                                      </p:cBhvr>
+                                      <p:to>
+                                        <p:strVal val="visible"/>
+                                      </p:to>
+                                    </p:set>
+                                  </p:childTnLst>
+                                </p:cTn>
+                              </p:par>
+                              <p:par>
+                                <p:cTn id="17" presetID="1" presetClass="entr" presetSubtype="0" fill="hold" grpId="0" nodeType="withEffect">
+                                  <p:stCondLst>
+                                    <p:cond delay="0"/>
+                                  </p:stCondLst>
+                                  <p:childTnLst>
+                                    <p:set>
+                                      <p:cBhvr>
+                                        <p:cTn id="18" dur="1" fill="hold">
+                                          <p:stCondLst>
+                                            <p:cond delay="0"/>
+                                          </p:stCondLst>
+                                        </p:cTn>
+                                        <p:tgtEl>
+                                          <p:spTgt spid="3">
+                                            <p:txEl>
+                                              <p:pRg st="5" end="5"/>
+                                            </p:txEl>
+                                          </p:spTgt>
+                                        </p:tgtEl>
+                                        <p:attrNameLst>
+                                          <p:attrName>style.visibility</p:attrName>
+                                        </p:attrNameLst>
+                                      </p:cBhvr>
+                                      <p:to>
+                                        <p:strVal val="visible"/>
+                                      </p:to>
+                                    </p:set>
+                                  </p:childTnLst>
+                                </p:cTn>
+                              </p:par>
+                            </p:childTnLst>
+                          </p:cTn>
+                        </p:par>
+                      </p:childTnLst>
+                    </p:cTn>
+                  </p:par>
+                  <p:par>
+                    <p:cTn id="19" fill="hold">
+                      <p:stCondLst>
+                        <p:cond delay="indefinite"/>
+                      </p:stCondLst>
+                      <p:childTnLst>
+                        <p:par>
+                          <p:cTn id="20" fill="hold">
+                            <p:stCondLst>
+                              <p:cond delay="0"/>
+                            </p:stCondLst>
+                            <p:childTnLst>
+                              <p:par>
+                                <p:cTn id="21" presetID="1" presetClass="entr" presetSubtype="0" fill="hold" grpId="0" nodeType="clickEffect">
+                                  <p:stCondLst>
+                                    <p:cond delay="0"/>
+                                  </p:stCondLst>
+                                  <p:childTnLst>
+                                    <p:set>
+                                      <p:cBhvr>
+                                        <p:cTn id="22" dur="1" fill="hold">
+                                          <p:stCondLst>
+                                            <p:cond delay="0"/>
+                                          </p:stCondLst>
+                                        </p:cTn>
+                                        <p:tgtEl>
+                                          <p:spTgt spid="3">
+                                            <p:txEl>
+                                              <p:pRg st="6" end="6"/>
+                                            </p:txEl>
+                                          </p:spTgt>
+                                        </p:tgtEl>
+                                        <p:attrNameLst>
+                                          <p:attrName>style.visibility</p:attrName>
+                                        </p:attrNameLst>
+                                      </p:cBhvr>
+                                      <p:to>
+                                        <p:strVal val="visible"/>
+                                      </p:to>
+                                    </p:set>
+                                  </p:childTnLst>
+                                </p:cTn>
+                              </p:par>
+                              <p:par>
+                                <p:cTn id="23" presetID="1" presetClass="entr" presetSubtype="0" fill="hold" grpId="0" nodeType="withEffect">
+                                  <p:stCondLst>
+                                    <p:cond delay="0"/>
+                                  </p:stCondLst>
+                                  <p:childTnLst>
+                                    <p:set>
+                                      <p:cBhvr>
+                                        <p:cTn id="24" dur="1" fill="hold">
+                                          <p:stCondLst>
+                                            <p:cond delay="0"/>
+                                          </p:stCondLst>
+                                        </p:cTn>
+                                        <p:tgtEl>
+                                          <p:spTgt spid="3">
+                                            <p:txEl>
+                                              <p:pRg st="7" end="7"/>
+                                            </p:txEl>
+                                          </p:spTgt>
+                                        </p:tgtEl>
+                                        <p:attrNameLst>
+                                          <p:attrName>style.visibility</p:attrName>
+                                        </p:attrNameLst>
+                                      </p:cBhvr>
+                                      <p:to>
+                                        <p:strVal val="visible"/>
+                                      </p:to>
+                                    </p:set>
+                                  </p:childTnLst>
+                                </p:cTn>
+                              </p:par>
+                              <p:par>
+                                <p:cTn id="25" presetID="1" presetClass="entr" presetSubtype="0" fill="hold" grpId="0" nodeType="withEffect">
+                                  <p:stCondLst>
+                                    <p:cond delay="0"/>
+                                  </p:stCondLst>
+                                  <p:childTnLst>
+                                    <p:set>
+                                      <p:cBhvr>
+                                        <p:cTn id="26" dur="1" fill="hold">
+                                          <p:stCondLst>
+                                            <p:cond delay="0"/>
+                                          </p:stCondLst>
+                                        </p:cTn>
+                                        <p:tgtEl>
+                                          <p:spTgt spid="3">
+                                            <p:txEl>
+                                              <p:pRg st="8" end="8"/>
+                                            </p:txEl>
+                                          </p:spTgt>
+                                        </p:tgtEl>
+                                        <p:attrNameLst>
+                                          <p:attrName>style.visibility</p:attrName>
+                                        </p:attrNameLst>
+                                      </p:cBhvr>
+                                      <p:to>
+                                        <p:strVal val="visible"/>
+                                      </p:to>
+                                    </p:set>
+                                  </p:childTnLst>
+                                </p:cTn>
+                              </p:par>
+                            </p:childTnLst>
+                          </p:cTn>
+                        </p:par>
+                      </p:childTnLst>
+                    </p:cTn>
+                  </p:par>
+                </p:childTnLst>
+              </p:cTn>
+              <p:prevCondLst>
+                <p:cond evt="onPrev" delay="0">
+                  <p:tgtEl>
+                    <p:sldTgt/>
+                  </p:tgtEl>
+                </p:cond>
+              </p:prevCondLst>
+              <p:nextCondLst>
+                <p:cond evt="onNext" delay="0">
+                  <p:tgtEl>
+                    <p:sldTgt/>
+                  </p:tgtEl>
+                </p:cond>
+              </p:nextCondLst>
+            </p:seq>
+          </p:childTnLst>
+        </p:cTn>
+      </p:par>
+    </p:tnLst>
+    <p:bldLst>
+      <p:bldP spid="3" grpId="0" uiExpand="1" build="p"/>
+    </p:bldLst>
+  </p:timing>
+</p:sld>
+</file>
+
+<file path=ppt/slides/slide28.xml><?xml version="1.0" encoding="utf-8"?>
+<p:sld xmlns:a="http://schemas.openxmlformats.org/drawingml/2006/main" xmlns:r="http://schemas.openxmlformats.org/officeDocument/2006/relationships" xmlns:p="http://schemas.openxmlformats.org/presentationml/2006/main">
+  <p:cSld>
+    <p:spTree>
+      <p:nvGrpSpPr>
+        <p:cNvPr id="1" name=""/>
+        <p:cNvGrpSpPr/>
+        <p:nvPr/>
+      </p:nvGrpSpPr>
+      <p:grpSpPr>
+        <a:xfrm>
+          <a:off x="0" y="0"/>
+          <a:ext cx="0" cy="0"/>
+          <a:chOff x="0" y="0"/>
+          <a:chExt cx="0" cy="0"/>
+        </a:xfrm>
+      </p:grpSpPr>
+      <p:sp>
+        <p:nvSpPr>
+          <p:cNvPr id="2" name="Title 1"/>
+          <p:cNvSpPr>
+            <a:spLocks noGrp="1"/>
+          </p:cNvSpPr>
+          <p:nvPr>
+            <p:ph type="title"/>
+          </p:nvPr>
+        </p:nvSpPr>
+        <p:spPr/>
+        <p:txBody>
+          <a:bodyPr/>
+          <a:lstStyle/>
+          <a:p>
+            <a:r>
+              <a:rPr lang="en-US" dirty="0" smtClean="0"/>
               <a:t>Conclusions</a:t>
             </a:r>
             <a:endParaRPr lang="nl-BE" dirty="0"/>
@@ -17648,7 +18156,7 @@
 </p:sld>
 </file>
 
-<file path=ppt/slides/slide28.xml><?xml version="1.0" encoding="utf-8"?>
+<file path=ppt/slides/slide29.xml><?xml version="1.0" encoding="utf-8"?>
 <p:sld xmlns:a="http://schemas.openxmlformats.org/drawingml/2006/main" xmlns:r="http://schemas.openxmlformats.org/officeDocument/2006/relationships" xmlns:p="http://schemas.openxmlformats.org/presentationml/2006/main">
   <p:cSld>
     <p:spTree>
@@ -18187,22 +18695,14 @@
             <a:pPr lvl="1"/>
             <a:r>
               <a:rPr lang="en-US" dirty="0" smtClean="0"/>
-              <a:t>standardized, currently </a:t>
-            </a:r>
-            <a:r>
-              <a:rPr lang="en-US" dirty="0" smtClean="0"/>
-              <a:t>MPI-3.1,</a:t>
+              <a:t>standardized, currently MPI-3.1,</a:t>
             </a:r>
             <a:br>
               <a:rPr lang="en-US" dirty="0" smtClean="0"/>
             </a:br>
             <a:r>
               <a:rPr lang="en-US" dirty="0" smtClean="0"/>
-              <a:t>implemented: </a:t>
-            </a:r>
-            <a:r>
-              <a:rPr lang="en-US" dirty="0" smtClean="0"/>
-              <a:t>most of MPI-3</a:t>
+              <a:t>implemented: most of MPI-3</a:t>
             </a:r>
           </a:p>
           <a:p>

</xml_diff>

<commit_message>
Added remark on MPI standard to presentation
</commit_message>
<xml_diff>
--- a/Mpi/mpi.pptx
+++ b/Mpi/mpi.pptx
@@ -132,6 +132,22 @@
       </a:defRPr>
     </a:lvl9pPr>
   </p:defaultTextStyle>
+  <p:extLst>
+    <p:ext uri="{EFAFB233-063F-42B5-8137-9DF3F51BA10A}">
+      <p15:sldGuideLst xmlns:p15="http://schemas.microsoft.com/office/powerpoint/2012/main">
+        <p15:guide id="1" orient="horz" pos="2160">
+          <p15:clr>
+            <a:srgbClr val="A4A3A4"/>
+          </p15:clr>
+        </p15:guide>
+        <p15:guide id="2" pos="2880">
+          <p15:clr>
+            <a:srgbClr val="A4A3A4"/>
+          </p15:clr>
+        </p15:guide>
+      </p15:sldGuideLst>
+    </p:ext>
+  </p:extLst>
 </p:presentation>
 </file>
 
@@ -316,7 +332,7 @@
           <a:p>
             <a:fld id="{05D05C77-BEE1-4DA0-9A20-2DDFB0AE2DEB}" type="datetimeFigureOut">
               <a:rPr lang="nl-BE" smtClean="0"/>
-              <a:t>5/12/2015</a:t>
+              <a:t>2016-01-08</a:t>
             </a:fld>
             <a:endParaRPr lang="nl-BE"/>
           </a:p>
@@ -486,7 +502,7 @@
           <a:p>
             <a:fld id="{05D05C77-BEE1-4DA0-9A20-2DDFB0AE2DEB}" type="datetimeFigureOut">
               <a:rPr lang="nl-BE" smtClean="0"/>
-              <a:t>5/12/2015</a:t>
+              <a:t>2016-01-08</a:t>
             </a:fld>
             <a:endParaRPr lang="nl-BE"/>
           </a:p>
@@ -666,7 +682,7 @@
           <a:p>
             <a:fld id="{05D05C77-BEE1-4DA0-9A20-2DDFB0AE2DEB}" type="datetimeFigureOut">
               <a:rPr lang="nl-BE" smtClean="0"/>
-              <a:t>5/12/2015</a:t>
+              <a:t>2016-01-08</a:t>
             </a:fld>
             <a:endParaRPr lang="nl-BE"/>
           </a:p>
@@ -836,7 +852,7 @@
           <a:p>
             <a:fld id="{05D05C77-BEE1-4DA0-9A20-2DDFB0AE2DEB}" type="datetimeFigureOut">
               <a:rPr lang="nl-BE" smtClean="0"/>
-              <a:t>5/12/2015</a:t>
+              <a:t>2016-01-08</a:t>
             </a:fld>
             <a:endParaRPr lang="nl-BE"/>
           </a:p>
@@ -1082,7 +1098,7 @@
           <a:p>
             <a:fld id="{05D05C77-BEE1-4DA0-9A20-2DDFB0AE2DEB}" type="datetimeFigureOut">
               <a:rPr lang="nl-BE" smtClean="0"/>
-              <a:t>5/12/2015</a:t>
+              <a:t>2016-01-08</a:t>
             </a:fld>
             <a:endParaRPr lang="nl-BE"/>
           </a:p>
@@ -1370,7 +1386,7 @@
           <a:p>
             <a:fld id="{05D05C77-BEE1-4DA0-9A20-2DDFB0AE2DEB}" type="datetimeFigureOut">
               <a:rPr lang="nl-BE" smtClean="0"/>
-              <a:t>5/12/2015</a:t>
+              <a:t>2016-01-08</a:t>
             </a:fld>
             <a:endParaRPr lang="nl-BE"/>
           </a:p>
@@ -1792,7 +1808,7 @@
           <a:p>
             <a:fld id="{05D05C77-BEE1-4DA0-9A20-2DDFB0AE2DEB}" type="datetimeFigureOut">
               <a:rPr lang="nl-BE" smtClean="0"/>
-              <a:t>5/12/2015</a:t>
+              <a:t>2016-01-08</a:t>
             </a:fld>
             <a:endParaRPr lang="nl-BE"/>
           </a:p>
@@ -1910,7 +1926,7 @@
           <a:p>
             <a:fld id="{05D05C77-BEE1-4DA0-9A20-2DDFB0AE2DEB}" type="datetimeFigureOut">
               <a:rPr lang="nl-BE" smtClean="0"/>
-              <a:t>5/12/2015</a:t>
+              <a:t>2016-01-08</a:t>
             </a:fld>
             <a:endParaRPr lang="nl-BE"/>
           </a:p>
@@ -2005,7 +2021,7 @@
           <a:p>
             <a:fld id="{05D05C77-BEE1-4DA0-9A20-2DDFB0AE2DEB}" type="datetimeFigureOut">
               <a:rPr lang="nl-BE" smtClean="0"/>
-              <a:t>5/12/2015</a:t>
+              <a:t>2016-01-08</a:t>
             </a:fld>
             <a:endParaRPr lang="nl-BE"/>
           </a:p>
@@ -2282,7 +2298,7 @@
           <a:p>
             <a:fld id="{05D05C77-BEE1-4DA0-9A20-2DDFB0AE2DEB}" type="datetimeFigureOut">
               <a:rPr lang="nl-BE" smtClean="0"/>
-              <a:t>5/12/2015</a:t>
+              <a:t>2016-01-08</a:t>
             </a:fld>
             <a:endParaRPr lang="nl-BE"/>
           </a:p>
@@ -2535,7 +2551,7 @@
           <a:p>
             <a:fld id="{05D05C77-BEE1-4DA0-9A20-2DDFB0AE2DEB}" type="datetimeFigureOut">
               <a:rPr lang="nl-BE" smtClean="0"/>
-              <a:t>5/12/2015</a:t>
+              <a:t>2016-01-08</a:t>
             </a:fld>
             <a:endParaRPr lang="nl-BE"/>
           </a:p>
@@ -2748,7 +2764,7 @@
           <a:p>
             <a:fld id="{05D05C77-BEE1-4DA0-9A20-2DDFB0AE2DEB}" type="datetimeFigureOut">
               <a:rPr lang="nl-BE" smtClean="0"/>
-              <a:t>5/12/2015</a:t>
+              <a:t>2016-01-08</a:t>
             </a:fld>
             <a:endParaRPr lang="nl-BE"/>
           </a:p>
@@ -3147,11 +3163,7 @@
             </a:br>
             <a:r>
               <a:rPr lang="en-US" dirty="0" smtClean="0"/>
-              <a:t>using </a:t>
-            </a:r>
-            <a:r>
-              <a:rPr lang="en-US" dirty="0" smtClean="0"/>
-              <a:t>MPI: a gentle introduction</a:t>
+              <a:t>using MPI: a gentle introduction</a:t>
             </a:r>
             <a:endParaRPr lang="nl-BE" dirty="0"/>
           </a:p>
@@ -17389,6 +17401,48 @@
           </a:p>
         </p:txBody>
       </p:sp>
+      <p:sp>
+        <p:nvSpPr>
+          <p:cNvPr id="4" name="TextBox 3"/>
+          <p:cNvSpPr txBox="1"/>
+          <p:nvPr/>
+        </p:nvSpPr>
+        <p:spPr>
+          <a:xfrm>
+            <a:off x="5724128" y="3915053"/>
+            <a:ext cx="2594043" cy="954107"/>
+          </a:xfrm>
+          <a:prstGeom prst="rect">
+            <a:avLst/>
+          </a:prstGeom>
+          <a:noFill/>
+          <a:ln>
+            <a:solidFill>
+              <a:schemeClr val="tx1"/>
+            </a:solidFill>
+          </a:ln>
+        </p:spPr>
+        <p:txBody>
+          <a:bodyPr wrap="none" rtlCol="0">
+            <a:spAutoFit/>
+          </a:bodyPr>
+          <a:lstStyle/>
+          <a:p>
+            <a:r>
+              <a:rPr lang="en-US" sz="2800" dirty="0" smtClean="0"/>
+              <a:t>Follow the specs</a:t>
+            </a:r>
+            <a:br>
+              <a:rPr lang="en-US" sz="2800" dirty="0" smtClean="0"/>
+            </a:br>
+            <a:r>
+              <a:rPr lang="en-US" sz="2800" dirty="0" smtClean="0"/>
+              <a:t>or die!</a:t>
+            </a:r>
+            <a:endParaRPr lang="nl-BE" sz="2800" dirty="0"/>
+          </a:p>
+        </p:txBody>
+      </p:sp>
     </p:spTree>
     <p:extLst>
       <p:ext uri="{BB962C8B-B14F-4D97-AF65-F5344CB8AC3E}">
@@ -17743,6 +17797,51 @@
                       </p:childTnLst>
                     </p:cTn>
                   </p:par>
+                  <p:par>
+                    <p:cTn id="27" fill="hold">
+                      <p:stCondLst>
+                        <p:cond delay="indefinite"/>
+                      </p:stCondLst>
+                      <p:childTnLst>
+                        <p:par>
+                          <p:cTn id="28" fill="hold">
+                            <p:stCondLst>
+                              <p:cond delay="0"/>
+                            </p:stCondLst>
+                            <p:childTnLst>
+                              <p:par>
+                                <p:cTn id="29" presetID="1" presetClass="entr" presetSubtype="0" fill="hold" grpId="0" nodeType="clickEffect">
+                                  <p:stCondLst>
+                                    <p:cond delay="0"/>
+                                  </p:stCondLst>
+                                  <p:childTnLst>
+                                    <p:set>
+                                      <p:cBhvr>
+                                        <p:cTn id="30" dur="1" fill="hold">
+                                          <p:stCondLst>
+                                            <p:cond delay="0"/>
+                                          </p:stCondLst>
+                                        </p:cTn>
+                                        <p:tgtEl>
+                                          <p:spTgt spid="4"/>
+                                        </p:tgtEl>
+                                        <p:attrNameLst>
+                                          <p:attrName>style.visibility</p:attrName>
+                                        </p:attrNameLst>
+                                      </p:cBhvr>
+                                      <p:to>
+                                        <p:strVal val="visible"/>
+                                      </p:to>
+                                    </p:set>
+                                  </p:childTnLst>
+                                </p:cTn>
+                              </p:par>
+                            </p:childTnLst>
+                          </p:cTn>
+                        </p:par>
+                      </p:childTnLst>
+                    </p:cTn>
+                  </p:par>
                 </p:childTnLst>
               </p:cTn>
               <p:prevCondLst>
@@ -17766,6 +17865,7 @@
     </p:tnLst>
     <p:bldLst>
       <p:bldP spid="3" grpId="0" uiExpand="1" build="p"/>
+      <p:bldP spid="4" grpId="0" animBg="1"/>
     </p:bldLst>
   </p:timing>
 </p:sld>

</xml_diff>

<commit_message>
Added link to MPI standard documents
</commit_message>
<xml_diff>
--- a/Mpi/mpi.pptx
+++ b/Mpi/mpi.pptx
@@ -18867,6 +18867,53 @@
           </a:p>
         </p:txBody>
       </p:sp>
+      <p:sp>
+        <p:nvSpPr>
+          <p:cNvPr id="4" name="TextBox 3"/>
+          <p:cNvSpPr txBox="1"/>
+          <p:nvPr/>
+        </p:nvSpPr>
+        <p:spPr>
+          <a:xfrm>
+            <a:off x="5420695" y="2780928"/>
+            <a:ext cx="3399777" cy="369332"/>
+          </a:xfrm>
+          <a:prstGeom prst="rect">
+            <a:avLst/>
+          </a:prstGeom>
+          <a:noFill/>
+          <a:ln>
+            <a:solidFill>
+              <a:schemeClr val="tx1"/>
+            </a:solidFill>
+          </a:ln>
+        </p:spPr>
+        <p:txBody>
+          <a:bodyPr wrap="none" rtlCol="0">
+            <a:spAutoFit/>
+          </a:bodyPr>
+          <a:lstStyle/>
+          <a:p>
+            <a:r>
+              <a:rPr lang="nl-BE" dirty="0">
+                <a:hlinkClick r:id="rId2"/>
+              </a:rPr>
+              <a:t>http://www.mpi-forum.org/docs</a:t>
+            </a:r>
+            <a:r>
+              <a:rPr lang="nl-BE" dirty="0" smtClean="0">
+                <a:hlinkClick r:id="rId2"/>
+              </a:rPr>
+              <a:t>/</a:t>
+            </a:r>
+            <a:r>
+              <a:rPr lang="nl-BE" dirty="0" smtClean="0"/>
+              <a:t> </a:t>
+            </a:r>
+            <a:endParaRPr lang="nl-BE" dirty="0"/>
+          </a:p>
+        </p:txBody>
+      </p:sp>
     </p:spTree>
     <p:extLst>
       <p:ext uri="{BB962C8B-B14F-4D97-AF65-F5344CB8AC3E}">
@@ -18980,6 +19027,33 @@
                                   </p:childTnLst>
                                 </p:cTn>
                               </p:par>
+                              <p:par>
+                                <p:cTn id="11" presetID="1" presetClass="entr" presetSubtype="0" fill="hold" grpId="0" nodeType="withEffect">
+                                  <p:stCondLst>
+                                    <p:cond delay="0"/>
+                                  </p:stCondLst>
+                                  <p:childTnLst>
+                                    <p:set>
+                                      <p:cBhvr>
+                                        <p:cTn id="12" dur="1" fill="hold">
+                                          <p:stCondLst>
+                                            <p:cond delay="0"/>
+                                          </p:stCondLst>
+                                        </p:cTn>
+                                        <p:tgtEl>
+                                          <p:spTgt spid="4"/>
+                                        </p:tgtEl>
+                                        <p:attrNameLst>
+                                          <p:attrName>style.visibility</p:attrName>
+                                        </p:attrNameLst>
+                                      </p:cBhvr>
+                                      <p:to>
+                                        <p:strVal val="visible"/>
+                                      </p:to>
+                                    </p:set>
+                                  </p:childTnLst>
+                                </p:cTn>
+                              </p:par>
                             </p:childTnLst>
                           </p:cTn>
                         </p:par>
@@ -18987,26 +19061,26 @@
                     </p:cTn>
                   </p:par>
                   <p:par>
-                    <p:cTn id="11" fill="hold">
+                    <p:cTn id="13" fill="hold">
                       <p:stCondLst>
                         <p:cond delay="indefinite"/>
                       </p:stCondLst>
                       <p:childTnLst>
                         <p:par>
-                          <p:cTn id="12" fill="hold">
+                          <p:cTn id="14" fill="hold">
                             <p:stCondLst>
                               <p:cond delay="0"/>
                             </p:stCondLst>
                             <p:childTnLst>
                               <p:par>
-                                <p:cTn id="13" presetID="1" presetClass="entr" presetSubtype="0" fill="hold" grpId="0" nodeType="clickEffect">
+                                <p:cTn id="15" presetID="1" presetClass="entr" presetSubtype="0" fill="hold" grpId="0" nodeType="clickEffect">
                                   <p:stCondLst>
                                     <p:cond delay="0"/>
                                   </p:stCondLst>
                                   <p:childTnLst>
                                     <p:set>
                                       <p:cBhvr>
-                                        <p:cTn id="14" dur="1" fill="hold">
+                                        <p:cTn id="16" dur="1" fill="hold">
                                           <p:stCondLst>
                                             <p:cond delay="0"/>
                                           </p:stCondLst>
@@ -19036,50 +19110,19 @@
                     </p:cTn>
                   </p:par>
                   <p:par>
-                    <p:cTn id="15" fill="hold">
+                    <p:cTn id="17" fill="hold">
                       <p:stCondLst>
                         <p:cond delay="indefinite"/>
                       </p:stCondLst>
                       <p:childTnLst>
                         <p:par>
-                          <p:cTn id="16" fill="hold">
+                          <p:cTn id="18" fill="hold">
                             <p:stCondLst>
                               <p:cond delay="0"/>
                             </p:stCondLst>
                             <p:childTnLst>
                               <p:par>
-                                <p:cTn id="17" presetID="1" presetClass="entr" presetSubtype="0" fill="hold" grpId="0" nodeType="clickEffect">
-                                  <p:stCondLst>
-                                    <p:cond delay="0"/>
-                                  </p:stCondLst>
-                                  <p:childTnLst>
-                                    <p:set>
-                                      <p:cBhvr>
-                                        <p:cTn id="18" dur="1" fill="hold">
-                                          <p:stCondLst>
-                                            <p:cond delay="0"/>
-                                          </p:stCondLst>
-                                        </p:cTn>
-                                        <p:tgtEl>
-                                          <p:spTgt spid="3">
-                                            <p:txEl>
-                                              <p:pRg st="3" end="3"/>
-                                            </p:txEl>
-                                          </p:spTgt>
-                                        </p:tgtEl>
-                                        <p:attrNameLst>
-                                          <p:attrName>style.visibility</p:attrName>
-                                        </p:attrNameLst>
-                                      </p:cBhvr>
-                                      <p:to>
-                                        <p:strVal val="visible"/>
-                                      </p:to>
-                                    </p:set>
-                                  </p:childTnLst>
-                                </p:cTn>
-                              </p:par>
-                              <p:par>
-                                <p:cTn id="19" presetID="1" presetClass="entr" presetSubtype="0" fill="hold" grpId="0" nodeType="withEffect">
+                                <p:cTn id="19" presetID="1" presetClass="entr" presetSubtype="0" fill="hold" grpId="0" nodeType="clickEffect">
                                   <p:stCondLst>
                                     <p:cond delay="0"/>
                                   </p:stCondLst>
@@ -19094,7 +19137,7 @@
                                         <p:tgtEl>
                                           <p:spTgt spid="3">
                                             <p:txEl>
-                                              <p:pRg st="4" end="4"/>
+                                              <p:pRg st="3" end="3"/>
                                             </p:txEl>
                                           </p:spTgt>
                                         </p:tgtEl>
@@ -19125,7 +19168,7 @@
                                         <p:tgtEl>
                                           <p:spTgt spid="3">
                                             <p:txEl>
-                                              <p:pRg st="5" end="5"/>
+                                              <p:pRg st="4" end="4"/>
                                             </p:txEl>
                                           </p:spTgt>
                                         </p:tgtEl>
@@ -19156,7 +19199,7 @@
                                         <p:tgtEl>
                                           <p:spTgt spid="3">
                                             <p:txEl>
-                                              <p:pRg st="6" end="6"/>
+                                              <p:pRg st="5" end="5"/>
                                             </p:txEl>
                                           </p:spTgt>
                                         </p:tgtEl>
@@ -19187,7 +19230,7 @@
                                         <p:tgtEl>
                                           <p:spTgt spid="3">
                                             <p:txEl>
-                                              <p:pRg st="7" end="7"/>
+                                              <p:pRg st="6" end="6"/>
                                             </p:txEl>
                                           </p:spTgt>
                                         </p:tgtEl>
@@ -19218,6 +19261,37 @@
                                         <p:tgtEl>
                                           <p:spTgt spid="3">
                                             <p:txEl>
+                                              <p:pRg st="7" end="7"/>
+                                            </p:txEl>
+                                          </p:spTgt>
+                                        </p:tgtEl>
+                                        <p:attrNameLst>
+                                          <p:attrName>style.visibility</p:attrName>
+                                        </p:attrNameLst>
+                                      </p:cBhvr>
+                                      <p:to>
+                                        <p:strVal val="visible"/>
+                                      </p:to>
+                                    </p:set>
+                                  </p:childTnLst>
+                                </p:cTn>
+                              </p:par>
+                              <p:par>
+                                <p:cTn id="29" presetID="1" presetClass="entr" presetSubtype="0" fill="hold" grpId="0" nodeType="withEffect">
+                                  <p:stCondLst>
+                                    <p:cond delay="0"/>
+                                  </p:stCondLst>
+                                  <p:childTnLst>
+                                    <p:set>
+                                      <p:cBhvr>
+                                        <p:cTn id="30" dur="1" fill="hold">
+                                          <p:stCondLst>
+                                            <p:cond delay="0"/>
+                                          </p:stCondLst>
+                                        </p:cTn>
+                                        <p:tgtEl>
+                                          <p:spTgt spid="3">
+                                            <p:txEl>
                                               <p:pRg st="8" end="8"/>
                                             </p:txEl>
                                           </p:spTgt>
@@ -19240,26 +19314,26 @@
                     </p:cTn>
                   </p:par>
                   <p:par>
-                    <p:cTn id="29" fill="hold">
+                    <p:cTn id="31" fill="hold">
                       <p:stCondLst>
                         <p:cond delay="indefinite"/>
                       </p:stCondLst>
                       <p:childTnLst>
                         <p:par>
-                          <p:cTn id="30" fill="hold">
+                          <p:cTn id="32" fill="hold">
                             <p:stCondLst>
                               <p:cond delay="0"/>
                             </p:stCondLst>
                             <p:childTnLst>
                               <p:par>
-                                <p:cTn id="31" presetID="1" presetClass="entr" presetSubtype="0" fill="hold" grpId="0" nodeType="clickEffect">
+                                <p:cTn id="33" presetID="1" presetClass="entr" presetSubtype="0" fill="hold" grpId="0" nodeType="clickEffect">
                                   <p:stCondLst>
                                     <p:cond delay="0"/>
                                   </p:stCondLst>
                                   <p:childTnLst>
                                     <p:set>
                                       <p:cBhvr>
-                                        <p:cTn id="32" dur="1" fill="hold">
+                                        <p:cTn id="34" dur="1" fill="hold">
                                           <p:stCondLst>
                                             <p:cond delay="0"/>
                                           </p:stCondLst>
@@ -19311,6 +19385,7 @@
     </p:tnLst>
     <p:bldLst>
       <p:bldP spid="3" grpId="0" uiExpand="1" build="p" bldLvl="2"/>
+      <p:bldP spid="4" grpId="0" animBg="1"/>
     </p:bldLst>
   </p:timing>
 </p:sld>

</xml_diff>